<commit_message>
Cập nhật báo cáo niên luận
</commit_message>
<xml_diff>
--- a/docs/NL04_Báo cáo niên luận.pptx
+++ b/docs/NL04_Báo cáo niên luận.pptx
@@ -4,6 +4,9 @@
   <p:sldMasterIdLst>
     <p:sldMasterId id="2147483648" r:id="rId1"/>
   </p:sldMasterIdLst>
+  <p:notesMasterIdLst>
+    <p:notesMasterId r:id="rId17"/>
+  </p:notesMasterIdLst>
   <p:sldIdLst>
     <p:sldId id="256" r:id="rId2"/>
     <p:sldId id="257" r:id="rId3"/>
@@ -16,7 +19,10 @@
     <p:sldId id="264" r:id="rId10"/>
     <p:sldId id="266" r:id="rId11"/>
     <p:sldId id="267" r:id="rId12"/>
-    <p:sldId id="268" r:id="rId13"/>
+    <p:sldId id="270" r:id="rId13"/>
+    <p:sldId id="271" r:id="rId14"/>
+    <p:sldId id="268" r:id="rId15"/>
+    <p:sldId id="269" r:id="rId16"/>
   </p:sldIdLst>
   <p:sldSz cx="12192000" cy="6858000"/>
   <p:notesSz cx="6858000" cy="9144000"/>
@@ -115,6 +121,11 @@
       </a:defRPr>
     </a:lvl9pPr>
   </p:defaultTextStyle>
+  <p:extLst>
+    <p:ext uri="{EFAFB233-063F-42B5-8137-9DF3F51BA10A}">
+      <p15:sldGuideLst xmlns:p15="http://schemas.microsoft.com/office/powerpoint/2012/main"/>
+    </p:ext>
+  </p:extLst>
 </p:presentation>
 </file>
 
@@ -1002,6 +1013,13 @@
         </dgm:presLayoutVars>
       </dgm:prSet>
       <dgm:spPr/>
+      <dgm:t>
+        <a:bodyPr/>
+        <a:lstStyle/>
+        <a:p>
+          <a:endParaRPr lang="en-US"/>
+        </a:p>
+      </dgm:t>
     </dgm:pt>
     <dgm:pt modelId="{28123A32-D72A-4CBD-9641-002C14849133}" type="pres">
       <dgm:prSet presAssocID="{CDF89E43-0910-482F-8230-ABB6112A2EE8}" presName="hierRoot1" presStyleCnt="0">
@@ -1033,6 +1051,13 @@
     <dgm:pt modelId="{E9F4A89D-90F5-4997-99C4-DA5C430ACC00}" type="pres">
       <dgm:prSet presAssocID="{CDF89E43-0910-482F-8230-ABB6112A2EE8}" presName="rootConnector1" presStyleLbl="node1" presStyleIdx="0" presStyleCnt="0"/>
       <dgm:spPr/>
+      <dgm:t>
+        <a:bodyPr/>
+        <a:lstStyle/>
+        <a:p>
+          <a:endParaRPr lang="en-US"/>
+        </a:p>
+      </dgm:t>
     </dgm:pt>
     <dgm:pt modelId="{0840243D-A62E-4C5A-A467-657546841E87}" type="pres">
       <dgm:prSet presAssocID="{CDF89E43-0910-482F-8230-ABB6112A2EE8}" presName="hierChild2" presStyleCnt="0"/>
@@ -1041,6 +1066,13 @@
     <dgm:pt modelId="{F8016569-E2EA-4547-8F53-233676BA5B2C}" type="pres">
       <dgm:prSet presAssocID="{49039BB9-F00A-4A69-BC98-321C0416C545}" presName="Name37" presStyleLbl="parChTrans1D2" presStyleIdx="0" presStyleCnt="2"/>
       <dgm:spPr/>
+      <dgm:t>
+        <a:bodyPr/>
+        <a:lstStyle/>
+        <a:p>
+          <a:endParaRPr lang="en-US"/>
+        </a:p>
+      </dgm:t>
     </dgm:pt>
     <dgm:pt modelId="{5CDCE9D4-33D0-4A5C-86D9-18D0C2BC0044}" type="pres">
       <dgm:prSet presAssocID="{1781B182-627B-4ECF-89B5-2EE12F81E9F0}" presName="hierRoot2" presStyleCnt="0">
@@ -1072,6 +1104,13 @@
     <dgm:pt modelId="{EC488F62-4960-4BD9-89CB-4B59B73BE176}" type="pres">
       <dgm:prSet presAssocID="{1781B182-627B-4ECF-89B5-2EE12F81E9F0}" presName="rootConnector" presStyleLbl="node2" presStyleIdx="0" presStyleCnt="2"/>
       <dgm:spPr/>
+      <dgm:t>
+        <a:bodyPr/>
+        <a:lstStyle/>
+        <a:p>
+          <a:endParaRPr lang="en-US"/>
+        </a:p>
+      </dgm:t>
     </dgm:pt>
     <dgm:pt modelId="{119509C0-C499-4D96-8212-DE2467FA52CA}" type="pres">
       <dgm:prSet presAssocID="{1781B182-627B-4ECF-89B5-2EE12F81E9F0}" presName="hierChild4" presStyleCnt="0"/>
@@ -1084,6 +1123,13 @@
     <dgm:pt modelId="{E54CDE51-E83D-48F0-87AF-5355223EB7B3}" type="pres">
       <dgm:prSet presAssocID="{8BFB5D24-8399-473F-9EEF-4B39141456C9}" presName="Name37" presStyleLbl="parChTrans1D2" presStyleIdx="1" presStyleCnt="2"/>
       <dgm:spPr/>
+      <dgm:t>
+        <a:bodyPr/>
+        <a:lstStyle/>
+        <a:p>
+          <a:endParaRPr lang="en-US"/>
+        </a:p>
+      </dgm:t>
     </dgm:pt>
     <dgm:pt modelId="{73FD9639-597F-4EF5-8A8C-44448DB4A260}" type="pres">
       <dgm:prSet presAssocID="{7D241BC5-6C7C-418F-8C1B-5AEA5734266C}" presName="hierRoot2" presStyleCnt="0">
@@ -1115,6 +1161,13 @@
     <dgm:pt modelId="{EB0A2BD9-98F7-4652-8663-AF457D89F4A2}" type="pres">
       <dgm:prSet presAssocID="{7D241BC5-6C7C-418F-8C1B-5AEA5734266C}" presName="rootConnector" presStyleLbl="node2" presStyleIdx="1" presStyleCnt="2"/>
       <dgm:spPr/>
+      <dgm:t>
+        <a:bodyPr/>
+        <a:lstStyle/>
+        <a:p>
+          <a:endParaRPr lang="en-US"/>
+        </a:p>
+      </dgm:t>
     </dgm:pt>
     <dgm:pt modelId="{6E80CE52-CA9F-4D30-BB88-CAE9626A3724}" type="pres">
       <dgm:prSet presAssocID="{7D241BC5-6C7C-418F-8C1B-5AEA5734266C}" presName="hierChild4" presStyleCnt="0"/>
@@ -1130,17 +1183,17 @@
     </dgm:pt>
   </dgm:ptLst>
   <dgm:cxnLst>
+    <dgm:cxn modelId="{4C40A902-7850-490A-B074-23C20DF33BB7}" type="presOf" srcId="{1781B182-627B-4ECF-89B5-2EE12F81E9F0}" destId="{EC488F62-4960-4BD9-89CB-4B59B73BE176}" srcOrd="1" destOrd="0" presId="urn:microsoft.com/office/officeart/2005/8/layout/orgChart1"/>
     <dgm:cxn modelId="{6FC86475-C786-4A18-BD7B-6B73D8A94965}" type="presOf" srcId="{CDF89E43-0910-482F-8230-ABB6112A2EE8}" destId="{E9F4A89D-90F5-4997-99C4-DA5C430ACC00}" srcOrd="1" destOrd="0" presId="urn:microsoft.com/office/officeart/2005/8/layout/orgChart1"/>
+    <dgm:cxn modelId="{E75F193A-6D44-4BE8-A1FA-B66868B8BE39}" type="presOf" srcId="{49039BB9-F00A-4A69-BC98-321C0416C545}" destId="{F8016569-E2EA-4547-8F53-233676BA5B2C}" srcOrd="0" destOrd="0" presId="urn:microsoft.com/office/officeart/2005/8/layout/orgChart1"/>
     <dgm:cxn modelId="{85236B7B-06C3-464C-9CC1-EECF557C017D}" srcId="{CDF89E43-0910-482F-8230-ABB6112A2EE8}" destId="{7D241BC5-6C7C-418F-8C1B-5AEA5734266C}" srcOrd="1" destOrd="0" parTransId="{8BFB5D24-8399-473F-9EEF-4B39141456C9}" sibTransId="{93A9FB87-7C41-4200-ABDF-D261ABF14A76}"/>
+    <dgm:cxn modelId="{28C11628-B840-4FD4-8F77-9A29C17180D1}" srcId="{CDF89E43-0910-482F-8230-ABB6112A2EE8}" destId="{1781B182-627B-4ECF-89B5-2EE12F81E9F0}" srcOrd="0" destOrd="0" parTransId="{49039BB9-F00A-4A69-BC98-321C0416C545}" sibTransId="{76E531B6-BFF7-4AA8-A7D8-0682BC5C2CE1}"/>
+    <dgm:cxn modelId="{3FB2908D-4465-4F38-925E-E505C2A7890D}" type="presOf" srcId="{1781B182-627B-4ECF-89B5-2EE12F81E9F0}" destId="{01792829-4886-455B-A91C-88A88BDB7AF0}" srcOrd="0" destOrd="0" presId="urn:microsoft.com/office/officeart/2005/8/layout/orgChart1"/>
+    <dgm:cxn modelId="{1C14CB62-5884-4AC4-BF23-F568C9607F41}" type="presOf" srcId="{7D241BC5-6C7C-418F-8C1B-5AEA5734266C}" destId="{29888ACB-A532-459D-9213-1E7F148EE712}" srcOrd="0" destOrd="0" presId="urn:microsoft.com/office/officeart/2005/8/layout/orgChart1"/>
+    <dgm:cxn modelId="{B4168F44-2DB3-4B4D-83CB-ADC6C088A2D9}" type="presOf" srcId="{779CB25C-D873-4451-85D6-AE5FDDCE400C}" destId="{7CF2DE4C-1416-4850-9ADD-F0DAFA32E167}" srcOrd="0" destOrd="0" presId="urn:microsoft.com/office/officeart/2005/8/layout/orgChart1"/>
+    <dgm:cxn modelId="{EC297607-419D-49F9-8E97-6F052C4BC459}" type="presOf" srcId="{CDF89E43-0910-482F-8230-ABB6112A2EE8}" destId="{05BBB6DD-027D-45BC-B086-2D143F57BCCE}" srcOrd="0" destOrd="0" presId="urn:microsoft.com/office/officeart/2005/8/layout/orgChart1"/>
+    <dgm:cxn modelId="{4E3F48F4-6BA6-4805-BD5A-A406E5463DD3}" srcId="{779CB25C-D873-4451-85D6-AE5FDDCE400C}" destId="{CDF89E43-0910-482F-8230-ABB6112A2EE8}" srcOrd="0" destOrd="0" parTransId="{F235C754-3D14-4747-B6EA-5FFDE437397E}" sibTransId="{B2194046-E1AB-4288-A79D-1BDB423550FB}"/>
     <dgm:cxn modelId="{F9FE44C9-2C37-4CB0-A209-A55409D86E59}" type="presOf" srcId="{7D241BC5-6C7C-418F-8C1B-5AEA5734266C}" destId="{EB0A2BD9-98F7-4652-8663-AF457D89F4A2}" srcOrd="1" destOrd="0" presId="urn:microsoft.com/office/officeart/2005/8/layout/orgChart1"/>
-    <dgm:cxn modelId="{EC297607-419D-49F9-8E97-6F052C4BC459}" type="presOf" srcId="{CDF89E43-0910-482F-8230-ABB6112A2EE8}" destId="{05BBB6DD-027D-45BC-B086-2D143F57BCCE}" srcOrd="0" destOrd="0" presId="urn:microsoft.com/office/officeart/2005/8/layout/orgChart1"/>
-    <dgm:cxn modelId="{E75F193A-6D44-4BE8-A1FA-B66868B8BE39}" type="presOf" srcId="{49039BB9-F00A-4A69-BC98-321C0416C545}" destId="{F8016569-E2EA-4547-8F53-233676BA5B2C}" srcOrd="0" destOrd="0" presId="urn:microsoft.com/office/officeart/2005/8/layout/orgChart1"/>
-    <dgm:cxn modelId="{3FB2908D-4465-4F38-925E-E505C2A7890D}" type="presOf" srcId="{1781B182-627B-4ECF-89B5-2EE12F81E9F0}" destId="{01792829-4886-455B-A91C-88A88BDB7AF0}" srcOrd="0" destOrd="0" presId="urn:microsoft.com/office/officeart/2005/8/layout/orgChart1"/>
-    <dgm:cxn modelId="{B4168F44-2DB3-4B4D-83CB-ADC6C088A2D9}" type="presOf" srcId="{779CB25C-D873-4451-85D6-AE5FDDCE400C}" destId="{7CF2DE4C-1416-4850-9ADD-F0DAFA32E167}" srcOrd="0" destOrd="0" presId="urn:microsoft.com/office/officeart/2005/8/layout/orgChart1"/>
-    <dgm:cxn modelId="{4E3F48F4-6BA6-4805-BD5A-A406E5463DD3}" srcId="{779CB25C-D873-4451-85D6-AE5FDDCE400C}" destId="{CDF89E43-0910-482F-8230-ABB6112A2EE8}" srcOrd="0" destOrd="0" parTransId="{F235C754-3D14-4747-B6EA-5FFDE437397E}" sibTransId="{B2194046-E1AB-4288-A79D-1BDB423550FB}"/>
-    <dgm:cxn modelId="{4C40A902-7850-490A-B074-23C20DF33BB7}" type="presOf" srcId="{1781B182-627B-4ECF-89B5-2EE12F81E9F0}" destId="{EC488F62-4960-4BD9-89CB-4B59B73BE176}" srcOrd="1" destOrd="0" presId="urn:microsoft.com/office/officeart/2005/8/layout/orgChart1"/>
-    <dgm:cxn modelId="{28C11628-B840-4FD4-8F77-9A29C17180D1}" srcId="{CDF89E43-0910-482F-8230-ABB6112A2EE8}" destId="{1781B182-627B-4ECF-89B5-2EE12F81E9F0}" srcOrd="0" destOrd="0" parTransId="{49039BB9-F00A-4A69-BC98-321C0416C545}" sibTransId="{76E531B6-BFF7-4AA8-A7D8-0682BC5C2CE1}"/>
-    <dgm:cxn modelId="{1C14CB62-5884-4AC4-BF23-F568C9607F41}" type="presOf" srcId="{7D241BC5-6C7C-418F-8C1B-5AEA5734266C}" destId="{29888ACB-A532-459D-9213-1E7F148EE712}" srcOrd="0" destOrd="0" presId="urn:microsoft.com/office/officeart/2005/8/layout/orgChart1"/>
     <dgm:cxn modelId="{9935E934-75C0-4FB0-B356-56A291C2C5B3}" type="presOf" srcId="{8BFB5D24-8399-473F-9EEF-4B39141456C9}" destId="{E54CDE51-E83D-48F0-87AF-5355223EB7B3}" srcOrd="0" destOrd="0" presId="urn:microsoft.com/office/officeart/2005/8/layout/orgChart1"/>
     <dgm:cxn modelId="{39211E3C-9EA3-4949-8AF8-63F8DAC93A80}" type="presParOf" srcId="{7CF2DE4C-1416-4850-9ADD-F0DAFA32E167}" destId="{28123A32-D72A-4CBD-9641-002C14849133}" srcOrd="0" destOrd="0" presId="urn:microsoft.com/office/officeart/2005/8/layout/orgChart1"/>
     <dgm:cxn modelId="{1315F0D4-A4E9-4C6C-940D-6C9379957910}" type="presParOf" srcId="{28123A32-D72A-4CBD-9641-002C14849133}" destId="{385F290D-C858-4C10-ABD8-E8980478C5B8}" srcOrd="0" destOrd="0" presId="urn:microsoft.com/office/officeart/2005/8/layout/orgChart1"/>
@@ -1167,7 +1220,7 @@
   <dgm:whole/>
   <dgm:extLst>
     <a:ext uri="http://schemas.microsoft.com/office/drawing/2008/diagram">
-      <dsp:dataModelExt xmlns:dsp="http://schemas.microsoft.com/office/drawing/2008/diagram" relId="rId6" minVer="http://schemas.openxmlformats.org/drawingml/2006/diagram"/>
+      <dsp:dataModelExt xmlns:dsp="http://schemas.microsoft.com/office/drawing/2008/diagram" relId="rId7" minVer="http://schemas.openxmlformats.org/drawingml/2006/diagram"/>
     </a:ext>
   </dgm:extLst>
 </dgm:dataModel>
@@ -3723,6 +3776,1315 @@
 </dgm:styleDef>
 </file>
 
+<file path=ppt/notesMasters/notesMaster1.xml><?xml version="1.0" encoding="utf-8"?>
+<p:notesMaster xmlns:a="http://schemas.openxmlformats.org/drawingml/2006/main" xmlns:r="http://schemas.openxmlformats.org/officeDocument/2006/relationships" xmlns:p="http://schemas.openxmlformats.org/presentationml/2006/main">
+  <p:cSld>
+    <p:bg>
+      <p:bgRef idx="1001">
+        <a:schemeClr val="bg1"/>
+      </p:bgRef>
+    </p:bg>
+    <p:spTree>
+      <p:nvGrpSpPr>
+        <p:cNvPr id="1" name=""/>
+        <p:cNvGrpSpPr/>
+        <p:nvPr/>
+      </p:nvGrpSpPr>
+      <p:grpSpPr>
+        <a:xfrm>
+          <a:off x="0" y="0"/>
+          <a:ext cx="0" cy="0"/>
+          <a:chOff x="0" y="0"/>
+          <a:chExt cx="0" cy="0"/>
+        </a:xfrm>
+      </p:grpSpPr>
+      <p:sp>
+        <p:nvSpPr>
+          <p:cNvPr id="2" name="Header Placeholder 1"/>
+          <p:cNvSpPr>
+            <a:spLocks noGrp="1"/>
+          </p:cNvSpPr>
+          <p:nvPr>
+            <p:ph type="hdr" sz="quarter"/>
+          </p:nvPr>
+        </p:nvSpPr>
+        <p:spPr>
+          <a:xfrm>
+            <a:off x="0" y="0"/>
+            <a:ext cx="2971800" cy="458788"/>
+          </a:xfrm>
+          <a:prstGeom prst="rect">
+            <a:avLst/>
+          </a:prstGeom>
+        </p:spPr>
+        <p:txBody>
+          <a:bodyPr vert="horz" lIns="91440" tIns="45720" rIns="91440" bIns="45720" rtlCol="0"/>
+          <a:lstStyle>
+            <a:lvl1pPr algn="l">
+              <a:defRPr sz="1200"/>
+            </a:lvl1pPr>
+          </a:lstStyle>
+          <a:p>
+            <a:endParaRPr lang="en-US"/>
+          </a:p>
+        </p:txBody>
+      </p:sp>
+      <p:sp>
+        <p:nvSpPr>
+          <p:cNvPr id="3" name="Date Placeholder 2"/>
+          <p:cNvSpPr>
+            <a:spLocks noGrp="1"/>
+          </p:cNvSpPr>
+          <p:nvPr>
+            <p:ph type="dt" idx="1"/>
+          </p:nvPr>
+        </p:nvSpPr>
+        <p:spPr>
+          <a:xfrm>
+            <a:off x="3884613" y="0"/>
+            <a:ext cx="2971800" cy="458788"/>
+          </a:xfrm>
+          <a:prstGeom prst="rect">
+            <a:avLst/>
+          </a:prstGeom>
+        </p:spPr>
+        <p:txBody>
+          <a:bodyPr vert="horz" lIns="91440" tIns="45720" rIns="91440" bIns="45720" rtlCol="0"/>
+          <a:lstStyle>
+            <a:lvl1pPr algn="r">
+              <a:defRPr sz="1200"/>
+            </a:lvl1pPr>
+          </a:lstStyle>
+          <a:p>
+            <a:fld id="{65B110FA-1E25-485A-895C-5267D4DE8D0D}" type="datetimeFigureOut">
+              <a:rPr lang="en-US" smtClean="0"/>
+              <a:t>11/10/2014</a:t>
+            </a:fld>
+            <a:endParaRPr lang="en-US"/>
+          </a:p>
+        </p:txBody>
+      </p:sp>
+      <p:sp>
+        <p:nvSpPr>
+          <p:cNvPr id="4" name="Slide Image Placeholder 3"/>
+          <p:cNvSpPr>
+            <a:spLocks noGrp="1" noRot="1" noChangeAspect="1"/>
+          </p:cNvSpPr>
+          <p:nvPr>
+            <p:ph type="sldImg" idx="2"/>
+          </p:nvPr>
+        </p:nvSpPr>
+        <p:spPr>
+          <a:xfrm>
+            <a:off x="685800" y="1143000"/>
+            <a:ext cx="5486400" cy="3086100"/>
+          </a:xfrm>
+          <a:prstGeom prst="rect">
+            <a:avLst/>
+          </a:prstGeom>
+          <a:noFill/>
+          <a:ln w="12700">
+            <a:solidFill>
+              <a:prstClr val="black"/>
+            </a:solidFill>
+          </a:ln>
+        </p:spPr>
+        <p:txBody>
+          <a:bodyPr vert="horz" lIns="91440" tIns="45720" rIns="91440" bIns="45720" rtlCol="0" anchor="ctr"/>
+          <a:lstStyle/>
+          <a:p>
+            <a:endParaRPr lang="en-US"/>
+          </a:p>
+        </p:txBody>
+      </p:sp>
+      <p:sp>
+        <p:nvSpPr>
+          <p:cNvPr id="5" name="Notes Placeholder 4"/>
+          <p:cNvSpPr>
+            <a:spLocks noGrp="1"/>
+          </p:cNvSpPr>
+          <p:nvPr>
+            <p:ph type="body" sz="quarter" idx="3"/>
+          </p:nvPr>
+        </p:nvSpPr>
+        <p:spPr>
+          <a:xfrm>
+            <a:off x="685800" y="4400550"/>
+            <a:ext cx="5486400" cy="3600450"/>
+          </a:xfrm>
+          <a:prstGeom prst="rect">
+            <a:avLst/>
+          </a:prstGeom>
+        </p:spPr>
+        <p:txBody>
+          <a:bodyPr vert="horz" lIns="91440" tIns="45720" rIns="91440" bIns="45720" rtlCol="0"/>
+          <a:lstStyle/>
+          <a:p>
+            <a:pPr lvl="0"/>
+            <a:r>
+              <a:rPr lang="en-US" smtClean="0"/>
+              <a:t>Click to edit Master text styles</a:t>
+            </a:r>
+          </a:p>
+          <a:p>
+            <a:pPr lvl="1"/>
+            <a:r>
+              <a:rPr lang="en-US" smtClean="0"/>
+              <a:t>Second level</a:t>
+            </a:r>
+          </a:p>
+          <a:p>
+            <a:pPr lvl="2"/>
+            <a:r>
+              <a:rPr lang="en-US" smtClean="0"/>
+              <a:t>Third level</a:t>
+            </a:r>
+          </a:p>
+          <a:p>
+            <a:pPr lvl="3"/>
+            <a:r>
+              <a:rPr lang="en-US" smtClean="0"/>
+              <a:t>Fourth level</a:t>
+            </a:r>
+          </a:p>
+          <a:p>
+            <a:pPr lvl="4"/>
+            <a:r>
+              <a:rPr lang="en-US" smtClean="0"/>
+              <a:t>Fifth level</a:t>
+            </a:r>
+            <a:endParaRPr lang="en-US"/>
+          </a:p>
+        </p:txBody>
+      </p:sp>
+      <p:sp>
+        <p:nvSpPr>
+          <p:cNvPr id="6" name="Footer Placeholder 5"/>
+          <p:cNvSpPr>
+            <a:spLocks noGrp="1"/>
+          </p:cNvSpPr>
+          <p:nvPr>
+            <p:ph type="ftr" sz="quarter" idx="4"/>
+          </p:nvPr>
+        </p:nvSpPr>
+        <p:spPr>
+          <a:xfrm>
+            <a:off x="0" y="8685213"/>
+            <a:ext cx="2971800" cy="458787"/>
+          </a:xfrm>
+          <a:prstGeom prst="rect">
+            <a:avLst/>
+          </a:prstGeom>
+        </p:spPr>
+        <p:txBody>
+          <a:bodyPr vert="horz" lIns="91440" tIns="45720" rIns="91440" bIns="45720" rtlCol="0" anchor="b"/>
+          <a:lstStyle>
+            <a:lvl1pPr algn="l">
+              <a:defRPr sz="1200"/>
+            </a:lvl1pPr>
+          </a:lstStyle>
+          <a:p>
+            <a:endParaRPr lang="en-US"/>
+          </a:p>
+        </p:txBody>
+      </p:sp>
+      <p:sp>
+        <p:nvSpPr>
+          <p:cNvPr id="7" name="Slide Number Placeholder 6"/>
+          <p:cNvSpPr>
+            <a:spLocks noGrp="1"/>
+          </p:cNvSpPr>
+          <p:nvPr>
+            <p:ph type="sldNum" sz="quarter" idx="5"/>
+          </p:nvPr>
+        </p:nvSpPr>
+        <p:spPr>
+          <a:xfrm>
+            <a:off x="3884613" y="8685213"/>
+            <a:ext cx="2971800" cy="458787"/>
+          </a:xfrm>
+          <a:prstGeom prst="rect">
+            <a:avLst/>
+          </a:prstGeom>
+        </p:spPr>
+        <p:txBody>
+          <a:bodyPr vert="horz" lIns="91440" tIns="45720" rIns="91440" bIns="45720" rtlCol="0" anchor="b"/>
+          <a:lstStyle>
+            <a:lvl1pPr algn="r">
+              <a:defRPr sz="1200"/>
+            </a:lvl1pPr>
+          </a:lstStyle>
+          <a:p>
+            <a:fld id="{90E8D240-C9F8-4409-902E-7350E5949E59}" type="slidenum">
+              <a:rPr lang="en-US" smtClean="0"/>
+              <a:t>‹#›</a:t>
+            </a:fld>
+            <a:endParaRPr lang="en-US"/>
+          </a:p>
+        </p:txBody>
+      </p:sp>
+    </p:spTree>
+    <p:extLst>
+      <p:ext uri="{BB962C8B-B14F-4D97-AF65-F5344CB8AC3E}">
+        <p14:creationId xmlns:p14="http://schemas.microsoft.com/office/powerpoint/2010/main" val="1470399242"/>
+      </p:ext>
+    </p:extLst>
+  </p:cSld>
+  <p:clrMap bg1="lt1" tx1="dk1" bg2="lt2" tx2="dk2" accent1="accent1" accent2="accent2" accent3="accent3" accent4="accent4" accent5="accent5" accent6="accent6" hlink="hlink" folHlink="folHlink"/>
+  <p:notesStyle>
+    <a:lvl1pPr marL="0" algn="l" defTabSz="914400" rtl="0" eaLnBrk="1" latinLnBrk="0" hangingPunct="1">
+      <a:defRPr sz="1200" kern="1200">
+        <a:solidFill>
+          <a:schemeClr val="tx1"/>
+        </a:solidFill>
+        <a:latin typeface="+mn-lt"/>
+        <a:ea typeface="+mn-ea"/>
+        <a:cs typeface="+mn-cs"/>
+      </a:defRPr>
+    </a:lvl1pPr>
+    <a:lvl2pPr marL="457200" algn="l" defTabSz="914400" rtl="0" eaLnBrk="1" latinLnBrk="0" hangingPunct="1">
+      <a:defRPr sz="1200" kern="1200">
+        <a:solidFill>
+          <a:schemeClr val="tx1"/>
+        </a:solidFill>
+        <a:latin typeface="+mn-lt"/>
+        <a:ea typeface="+mn-ea"/>
+        <a:cs typeface="+mn-cs"/>
+      </a:defRPr>
+    </a:lvl2pPr>
+    <a:lvl3pPr marL="914400" algn="l" defTabSz="914400" rtl="0" eaLnBrk="1" latinLnBrk="0" hangingPunct="1">
+      <a:defRPr sz="1200" kern="1200">
+        <a:solidFill>
+          <a:schemeClr val="tx1"/>
+        </a:solidFill>
+        <a:latin typeface="+mn-lt"/>
+        <a:ea typeface="+mn-ea"/>
+        <a:cs typeface="+mn-cs"/>
+      </a:defRPr>
+    </a:lvl3pPr>
+    <a:lvl4pPr marL="1371600" algn="l" defTabSz="914400" rtl="0" eaLnBrk="1" latinLnBrk="0" hangingPunct="1">
+      <a:defRPr sz="1200" kern="1200">
+        <a:solidFill>
+          <a:schemeClr val="tx1"/>
+        </a:solidFill>
+        <a:latin typeface="+mn-lt"/>
+        <a:ea typeface="+mn-ea"/>
+        <a:cs typeface="+mn-cs"/>
+      </a:defRPr>
+    </a:lvl4pPr>
+    <a:lvl5pPr marL="1828800" algn="l" defTabSz="914400" rtl="0" eaLnBrk="1" latinLnBrk="0" hangingPunct="1">
+      <a:defRPr sz="1200" kern="1200">
+        <a:solidFill>
+          <a:schemeClr val="tx1"/>
+        </a:solidFill>
+        <a:latin typeface="+mn-lt"/>
+        <a:ea typeface="+mn-ea"/>
+        <a:cs typeface="+mn-cs"/>
+      </a:defRPr>
+    </a:lvl5pPr>
+    <a:lvl6pPr marL="2286000" algn="l" defTabSz="914400" rtl="0" eaLnBrk="1" latinLnBrk="0" hangingPunct="1">
+      <a:defRPr sz="1200" kern="1200">
+        <a:solidFill>
+          <a:schemeClr val="tx1"/>
+        </a:solidFill>
+        <a:latin typeface="+mn-lt"/>
+        <a:ea typeface="+mn-ea"/>
+        <a:cs typeface="+mn-cs"/>
+      </a:defRPr>
+    </a:lvl6pPr>
+    <a:lvl7pPr marL="2743200" algn="l" defTabSz="914400" rtl="0" eaLnBrk="1" latinLnBrk="0" hangingPunct="1">
+      <a:defRPr sz="1200" kern="1200">
+        <a:solidFill>
+          <a:schemeClr val="tx1"/>
+        </a:solidFill>
+        <a:latin typeface="+mn-lt"/>
+        <a:ea typeface="+mn-ea"/>
+        <a:cs typeface="+mn-cs"/>
+      </a:defRPr>
+    </a:lvl7pPr>
+    <a:lvl8pPr marL="3200400" algn="l" defTabSz="914400" rtl="0" eaLnBrk="1" latinLnBrk="0" hangingPunct="1">
+      <a:defRPr sz="1200" kern="1200">
+        <a:solidFill>
+          <a:schemeClr val="tx1"/>
+        </a:solidFill>
+        <a:latin typeface="+mn-lt"/>
+        <a:ea typeface="+mn-ea"/>
+        <a:cs typeface="+mn-cs"/>
+      </a:defRPr>
+    </a:lvl8pPr>
+    <a:lvl9pPr marL="3657600" algn="l" defTabSz="914400" rtl="0" eaLnBrk="1" latinLnBrk="0" hangingPunct="1">
+      <a:defRPr sz="1200" kern="1200">
+        <a:solidFill>
+          <a:schemeClr val="tx1"/>
+        </a:solidFill>
+        <a:latin typeface="+mn-lt"/>
+        <a:ea typeface="+mn-ea"/>
+        <a:cs typeface="+mn-cs"/>
+      </a:defRPr>
+    </a:lvl9pPr>
+  </p:notesStyle>
+</p:notesMaster>
+</file>
+
+<file path=ppt/notesSlides/notesSlide1.xml><?xml version="1.0" encoding="utf-8"?>
+<p:notes xmlns:a="http://schemas.openxmlformats.org/drawingml/2006/main" xmlns:r="http://schemas.openxmlformats.org/officeDocument/2006/relationships" xmlns:p="http://schemas.openxmlformats.org/presentationml/2006/main">
+  <p:cSld>
+    <p:spTree>
+      <p:nvGrpSpPr>
+        <p:cNvPr id="1" name=""/>
+        <p:cNvGrpSpPr/>
+        <p:nvPr/>
+      </p:nvGrpSpPr>
+      <p:grpSpPr>
+        <a:xfrm>
+          <a:off x="0" y="0"/>
+          <a:ext cx="0" cy="0"/>
+          <a:chOff x="0" y="0"/>
+          <a:chExt cx="0" cy="0"/>
+        </a:xfrm>
+      </p:grpSpPr>
+      <p:sp>
+        <p:nvSpPr>
+          <p:cNvPr id="2" name="Slide Image Placeholder 1"/>
+          <p:cNvSpPr>
+            <a:spLocks noGrp="1" noRot="1" noChangeAspect="1"/>
+          </p:cNvSpPr>
+          <p:nvPr>
+            <p:ph type="sldImg"/>
+          </p:nvPr>
+        </p:nvSpPr>
+        <p:spPr/>
+      </p:sp>
+      <p:sp>
+        <p:nvSpPr>
+          <p:cNvPr id="3" name="Notes Placeholder 2"/>
+          <p:cNvSpPr>
+            <a:spLocks noGrp="1"/>
+          </p:cNvSpPr>
+          <p:nvPr>
+            <p:ph type="body" idx="1"/>
+          </p:nvPr>
+        </p:nvSpPr>
+        <p:spPr/>
+        <p:txBody>
+          <a:bodyPr/>
+          <a:lstStyle/>
+          <a:p>
+            <a:r>
+              <a:rPr lang="en-US" sz="1200" kern="1200" smtClean="0">
+                <a:solidFill>
+                  <a:schemeClr val="tx1"/>
+                </a:solidFill>
+                <a:effectLst/>
+                <a:latin typeface="+mn-lt"/>
+                <a:ea typeface="+mn-ea"/>
+                <a:cs typeface="+mn-cs"/>
+              </a:rPr>
+              <a:t>Lương</a:t>
+            </a:r>
+            <a:r>
+              <a:rPr lang="en-US" sz="1200" kern="1200" baseline="0" smtClean="0">
+                <a:solidFill>
+                  <a:schemeClr val="tx1"/>
+                </a:solidFill>
+                <a:effectLst/>
+                <a:latin typeface="+mn-lt"/>
+                <a:ea typeface="+mn-ea"/>
+                <a:cs typeface="+mn-cs"/>
+              </a:rPr>
+              <a:t> Đức Duy:</a:t>
+            </a:r>
+          </a:p>
+          <a:p>
+            <a:r>
+              <a:rPr lang="en-US" sz="1200" kern="1200" smtClean="0">
+                <a:solidFill>
+                  <a:schemeClr val="tx1"/>
+                </a:solidFill>
+                <a:effectLst/>
+                <a:latin typeface="+mn-lt"/>
+                <a:ea typeface="+mn-ea"/>
+                <a:cs typeface="+mn-cs"/>
+              </a:rPr>
+              <a:t>- Phân công công việc, lịch họp cũng như xúc tiến các thành viên khác trong nhóm hoàn thành đúng tiến độ công việc.</a:t>
+            </a:r>
+          </a:p>
+          <a:p>
+            <a:r>
+              <a:rPr lang="en-US" sz="1200" kern="1200" smtClean="0">
+                <a:solidFill>
+                  <a:schemeClr val="tx1"/>
+                </a:solidFill>
+                <a:effectLst/>
+                <a:latin typeface="+mn-lt"/>
+                <a:ea typeface="+mn-ea"/>
+                <a:cs typeface="+mn-cs"/>
+              </a:rPr>
+              <a:t>-Thiết kế viên, lập trình viên, viết tài liệu.</a:t>
+            </a:r>
+          </a:p>
+          <a:p>
+            <a:r>
+              <a:rPr lang="en-US" sz="1200" kern="1200" smtClean="0">
+                <a:solidFill>
+                  <a:schemeClr val="tx1"/>
+                </a:solidFill>
+                <a:effectLst/>
+                <a:latin typeface="+mn-lt"/>
+                <a:ea typeface="+mn-ea"/>
+                <a:cs typeface="+mn-cs"/>
+              </a:rPr>
+              <a:t>Ngô</a:t>
+            </a:r>
+            <a:r>
+              <a:rPr lang="en-US" sz="1200" kern="1200" baseline="0" smtClean="0">
+                <a:solidFill>
+                  <a:schemeClr val="tx1"/>
+                </a:solidFill>
+                <a:effectLst/>
+                <a:latin typeface="+mn-lt"/>
+                <a:ea typeface="+mn-ea"/>
+                <a:cs typeface="+mn-cs"/>
+              </a:rPr>
+              <a:t> Minh Phương</a:t>
+            </a:r>
+            <a:endParaRPr lang="en-US" sz="1200" kern="1200" smtClean="0">
+              <a:solidFill>
+                <a:schemeClr val="tx1"/>
+              </a:solidFill>
+              <a:effectLst/>
+              <a:latin typeface="+mn-lt"/>
+              <a:ea typeface="+mn-ea"/>
+              <a:cs typeface="+mn-cs"/>
+            </a:endParaRPr>
+          </a:p>
+          <a:p>
+            <a:r>
+              <a:rPr lang="en-US" sz="1200" kern="1200" smtClean="0">
+                <a:solidFill>
+                  <a:schemeClr val="tx1"/>
+                </a:solidFill>
+                <a:effectLst/>
+                <a:latin typeface="+mn-lt"/>
+                <a:ea typeface="+mn-ea"/>
+                <a:cs typeface="+mn-cs"/>
+              </a:rPr>
+              <a:t>-Thiết kế viên, lập trình viên, viết tài liệu.</a:t>
+            </a:r>
+          </a:p>
+          <a:p>
+            <a:r>
+              <a:rPr lang="en-US" sz="1200" kern="1200" smtClean="0">
+                <a:solidFill>
+                  <a:schemeClr val="tx1"/>
+                </a:solidFill>
+                <a:effectLst/>
+                <a:latin typeface="+mn-lt"/>
+                <a:ea typeface="+mn-ea"/>
+                <a:cs typeface="+mn-cs"/>
+              </a:rPr>
+              <a:t>Nguyễn</a:t>
+            </a:r>
+            <a:r>
+              <a:rPr lang="en-US" sz="1200" kern="1200" baseline="0" smtClean="0">
+                <a:solidFill>
+                  <a:schemeClr val="tx1"/>
+                </a:solidFill>
+                <a:effectLst/>
+                <a:latin typeface="+mn-lt"/>
+                <a:ea typeface="+mn-ea"/>
+                <a:cs typeface="+mn-cs"/>
+              </a:rPr>
+              <a:t> Hoàng Đông</a:t>
+            </a:r>
+            <a:endParaRPr lang="en-US" sz="1200" kern="1200" smtClean="0">
+              <a:solidFill>
+                <a:schemeClr val="tx1"/>
+              </a:solidFill>
+              <a:effectLst/>
+              <a:latin typeface="+mn-lt"/>
+              <a:ea typeface="+mn-ea"/>
+              <a:cs typeface="+mn-cs"/>
+            </a:endParaRPr>
+          </a:p>
+          <a:p>
+            <a:r>
+              <a:rPr lang="en-US" sz="1200" kern="1200" smtClean="0">
+                <a:solidFill>
+                  <a:schemeClr val="tx1"/>
+                </a:solidFill>
+                <a:effectLst/>
+                <a:latin typeface="+mn-lt"/>
+                <a:ea typeface="+mn-ea"/>
+                <a:cs typeface="+mn-cs"/>
+              </a:rPr>
+              <a:t>-Thiết kế viên, lập trình viên, viết tài liệu.</a:t>
+            </a:r>
+          </a:p>
+          <a:p>
+            <a:r>
+              <a:rPr lang="en-US" sz="1200" kern="1200" smtClean="0">
+                <a:solidFill>
+                  <a:schemeClr val="tx1"/>
+                </a:solidFill>
+                <a:effectLst/>
+                <a:latin typeface="+mn-lt"/>
+                <a:ea typeface="+mn-ea"/>
+                <a:cs typeface="+mn-cs"/>
+              </a:rPr>
+              <a:t>Kênh</a:t>
+            </a:r>
+            <a:r>
+              <a:rPr lang="en-US" sz="1200" kern="1200" baseline="0" smtClean="0">
+                <a:solidFill>
+                  <a:schemeClr val="tx1"/>
+                </a:solidFill>
+                <a:effectLst/>
+                <a:latin typeface="+mn-lt"/>
+                <a:ea typeface="+mn-ea"/>
+                <a:cs typeface="+mn-cs"/>
+              </a:rPr>
+              <a:t> giao tiếp:</a:t>
+            </a:r>
+          </a:p>
+          <a:p>
+            <a:pPr marL="0" marR="0" indent="0" algn="l" defTabSz="914400" rtl="0" eaLnBrk="1" fontAlgn="auto" latinLnBrk="0" hangingPunct="1">
+              <a:lnSpc>
+                <a:spcPct val="100000"/>
+              </a:lnSpc>
+              <a:spcBef>
+                <a:spcPts val="0"/>
+              </a:spcBef>
+              <a:spcAft>
+                <a:spcPts val="0"/>
+              </a:spcAft>
+              <a:buClrTx/>
+              <a:buSzTx/>
+              <a:buFontTx/>
+              <a:buNone/>
+              <a:tabLst/>
+              <a:defRPr/>
+            </a:pPr>
+            <a:r>
+              <a:rPr lang="en-US" sz="1200" kern="1200" smtClean="0">
+                <a:solidFill>
+                  <a:schemeClr val="tx1"/>
+                </a:solidFill>
+                <a:effectLst/>
+                <a:latin typeface="+mn-lt"/>
+                <a:ea typeface="+mn-ea"/>
+                <a:cs typeface="+mn-cs"/>
+              </a:rPr>
+              <a:t>Nhóm liên lạc với nhau, với khách hàng, người sử dụng, người quản lý bằng các phương tiện như: email, điện thoại, Trello và các buổi làm việc trực tiếp.</a:t>
+            </a:r>
+          </a:p>
+          <a:p>
+            <a:endParaRPr lang="en-US" sz="1200" kern="1200">
+              <a:solidFill>
+                <a:schemeClr val="tx1"/>
+              </a:solidFill>
+              <a:effectLst/>
+              <a:latin typeface="+mn-lt"/>
+              <a:ea typeface="+mn-ea"/>
+              <a:cs typeface="+mn-cs"/>
+            </a:endParaRPr>
+          </a:p>
+        </p:txBody>
+      </p:sp>
+      <p:sp>
+        <p:nvSpPr>
+          <p:cNvPr id="4" name="Slide Number Placeholder 3"/>
+          <p:cNvSpPr>
+            <a:spLocks noGrp="1"/>
+          </p:cNvSpPr>
+          <p:nvPr>
+            <p:ph type="sldNum" sz="quarter" idx="10"/>
+          </p:nvPr>
+        </p:nvSpPr>
+        <p:spPr/>
+        <p:txBody>
+          <a:bodyPr/>
+          <a:lstStyle/>
+          <a:p>
+            <a:fld id="{90E8D240-C9F8-4409-902E-7350E5949E59}" type="slidenum">
+              <a:rPr lang="en-US" smtClean="0"/>
+              <a:t>4</a:t>
+            </a:fld>
+            <a:endParaRPr lang="en-US"/>
+          </a:p>
+        </p:txBody>
+      </p:sp>
+    </p:spTree>
+    <p:extLst>
+      <p:ext uri="{BB962C8B-B14F-4D97-AF65-F5344CB8AC3E}">
+        <p14:creationId xmlns:p14="http://schemas.microsoft.com/office/powerpoint/2010/main" val="2526883649"/>
+      </p:ext>
+    </p:extLst>
+  </p:cSld>
+  <p:clrMapOvr>
+    <a:masterClrMapping/>
+  </p:clrMapOvr>
+</p:notes>
+</file>
+
+<file path=ppt/notesSlides/notesSlide2.xml><?xml version="1.0" encoding="utf-8"?>
+<p:notes xmlns:a="http://schemas.openxmlformats.org/drawingml/2006/main" xmlns:r="http://schemas.openxmlformats.org/officeDocument/2006/relationships" xmlns:p="http://schemas.openxmlformats.org/presentationml/2006/main">
+  <p:cSld>
+    <p:spTree>
+      <p:nvGrpSpPr>
+        <p:cNvPr id="1" name=""/>
+        <p:cNvGrpSpPr/>
+        <p:nvPr/>
+      </p:nvGrpSpPr>
+      <p:grpSpPr>
+        <a:xfrm>
+          <a:off x="0" y="0"/>
+          <a:ext cx="0" cy="0"/>
+          <a:chOff x="0" y="0"/>
+          <a:chExt cx="0" cy="0"/>
+        </a:xfrm>
+      </p:grpSpPr>
+      <p:sp>
+        <p:nvSpPr>
+          <p:cNvPr id="2" name="Slide Image Placeholder 1"/>
+          <p:cNvSpPr>
+            <a:spLocks noGrp="1" noRot="1" noChangeAspect="1"/>
+          </p:cNvSpPr>
+          <p:nvPr>
+            <p:ph type="sldImg"/>
+          </p:nvPr>
+        </p:nvSpPr>
+        <p:spPr/>
+      </p:sp>
+      <p:sp>
+        <p:nvSpPr>
+          <p:cNvPr id="3" name="Notes Placeholder 2"/>
+          <p:cNvSpPr>
+            <a:spLocks noGrp="1"/>
+          </p:cNvSpPr>
+          <p:nvPr>
+            <p:ph type="body" idx="1"/>
+          </p:nvPr>
+        </p:nvSpPr>
+        <p:spPr/>
+        <p:txBody>
+          <a:bodyPr/>
+          <a:lstStyle/>
+          <a:p>
+            <a:r>
+              <a:rPr lang="en-US" sz="1200" kern="1200" smtClean="0">
+                <a:solidFill>
+                  <a:schemeClr val="tx1"/>
+                </a:solidFill>
+                <a:effectLst/>
+                <a:latin typeface="+mn-lt"/>
+                <a:ea typeface="+mn-ea"/>
+                <a:cs typeface="+mn-cs"/>
+              </a:rPr>
+              <a:t>Lương Đức Duy</a:t>
+            </a:r>
+          </a:p>
+          <a:p>
+            <a:r>
+              <a:rPr lang="en-US" sz="1200" kern="1200" smtClean="0">
+                <a:solidFill>
+                  <a:schemeClr val="tx1"/>
+                </a:solidFill>
+                <a:effectLst/>
+                <a:latin typeface="+mn-lt"/>
+                <a:ea typeface="+mn-ea"/>
+                <a:cs typeface="+mn-cs"/>
+              </a:rPr>
+              <a:t>Trưởng nhóm</a:t>
+            </a:r>
+          </a:p>
+          <a:p>
+            <a:r>
+              <a:rPr lang="en-US" sz="1200" kern="1200" smtClean="0">
+                <a:solidFill>
+                  <a:schemeClr val="tx1"/>
+                </a:solidFill>
+                <a:effectLst/>
+                <a:latin typeface="+mn-lt"/>
+                <a:ea typeface="+mn-ea"/>
+                <a:cs typeface="+mn-cs"/>
+              </a:rPr>
+              <a:t>Quản lý chung, đảm bảo chất lượng thiết kế kiến trúc.</a:t>
+            </a:r>
+          </a:p>
+          <a:p>
+            <a:r>
+              <a:rPr lang="en-US" sz="1200" kern="1200" smtClean="0">
+                <a:solidFill>
+                  <a:schemeClr val="tx1"/>
+                </a:solidFill>
+                <a:effectLst/>
+                <a:latin typeface="+mn-lt"/>
+                <a:ea typeface="+mn-ea"/>
+                <a:cs typeface="+mn-cs"/>
+              </a:rPr>
+              <a:t>Nguyễn Hoàng Đông</a:t>
+            </a:r>
+          </a:p>
+          <a:p>
+            <a:r>
+              <a:rPr lang="en-US" sz="1200" kern="1200" smtClean="0">
+                <a:solidFill>
+                  <a:schemeClr val="tx1"/>
+                </a:solidFill>
+                <a:effectLst/>
+                <a:latin typeface="+mn-lt"/>
+                <a:ea typeface="+mn-ea"/>
+                <a:cs typeface="+mn-cs"/>
+              </a:rPr>
+              <a:t>Thành viên</a:t>
+            </a:r>
+          </a:p>
+          <a:p>
+            <a:r>
+              <a:rPr lang="en-US" sz="1200" kern="1200" smtClean="0">
+                <a:solidFill>
+                  <a:schemeClr val="tx1"/>
+                </a:solidFill>
+                <a:effectLst/>
+                <a:latin typeface="+mn-lt"/>
+                <a:ea typeface="+mn-ea"/>
+                <a:cs typeface="+mn-cs"/>
+              </a:rPr>
+              <a:t>Đảm bảo chất lượng tài liệu.</a:t>
+            </a:r>
+          </a:p>
+          <a:p>
+            <a:r>
+              <a:rPr lang="en-US" sz="1200" kern="1200" smtClean="0">
+                <a:solidFill>
+                  <a:schemeClr val="tx1"/>
+                </a:solidFill>
+                <a:effectLst/>
+                <a:latin typeface="+mn-lt"/>
+                <a:ea typeface="+mn-ea"/>
+                <a:cs typeface="+mn-cs"/>
+              </a:rPr>
+              <a:t>Ngô Minh Phương</a:t>
+            </a:r>
+          </a:p>
+          <a:p>
+            <a:r>
+              <a:rPr lang="en-US" sz="1200" kern="1200" smtClean="0">
+                <a:solidFill>
+                  <a:schemeClr val="tx1"/>
+                </a:solidFill>
+                <a:effectLst/>
+                <a:latin typeface="+mn-lt"/>
+                <a:ea typeface="+mn-ea"/>
+                <a:cs typeface="+mn-cs"/>
+              </a:rPr>
+              <a:t>Thành viên</a:t>
+            </a:r>
+          </a:p>
+          <a:p>
+            <a:r>
+              <a:rPr lang="en-US" sz="1200" kern="1200" smtClean="0">
+                <a:solidFill>
+                  <a:schemeClr val="tx1"/>
+                </a:solidFill>
+                <a:effectLst/>
+                <a:latin typeface="+mn-lt"/>
+                <a:ea typeface="+mn-ea"/>
+                <a:cs typeface="+mn-cs"/>
+              </a:rPr>
+              <a:t>Đảm bảo chất lượng code, kiểm thử.</a:t>
+            </a:r>
+          </a:p>
+          <a:p>
+            <a:endParaRPr lang="en-US" smtClean="0"/>
+          </a:p>
+          <a:p>
+            <a:r>
+              <a:rPr lang="en-US" smtClean="0"/>
+              <a:t>Các</a:t>
+            </a:r>
+            <a:r>
+              <a:rPr lang="en-US" baseline="0" smtClean="0"/>
+              <a:t> quy tắc đặt tên biến, comment, đặt tên tài liệu, trình bày tài liệu, đề mục.</a:t>
+            </a:r>
+          </a:p>
+          <a:p>
+            <a:endParaRPr lang="en-US" baseline="0" smtClean="0"/>
+          </a:p>
+          <a:p>
+            <a:pPr lvl="0"/>
+            <a:r>
+              <a:rPr lang="en-US" sz="1200" kern="1200" smtClean="0">
+                <a:solidFill>
+                  <a:schemeClr val="tx1"/>
+                </a:solidFill>
+                <a:effectLst/>
+                <a:latin typeface="+mn-lt"/>
+                <a:ea typeface="+mn-ea"/>
+                <a:cs typeface="+mn-cs"/>
+              </a:rPr>
+              <a:t>CheckStyle: dùng để kiểm tra nội dung code có đạt chuẩn quy tắc code.</a:t>
+            </a:r>
+          </a:p>
+          <a:p>
+            <a:pPr lvl="0"/>
+            <a:r>
+              <a:rPr lang="en-US" sz="1200" kern="1200" smtClean="0">
+                <a:solidFill>
+                  <a:schemeClr val="tx1"/>
+                </a:solidFill>
+                <a:effectLst/>
+                <a:latin typeface="+mn-lt"/>
+                <a:ea typeface="+mn-ea"/>
+                <a:cs typeface="+mn-cs"/>
+              </a:rPr>
+              <a:t>FindBugs: dùng để tìm các bug trong file Java như bắt các trường hợp có thể sinh ra exception.</a:t>
+            </a:r>
+          </a:p>
+          <a:p>
+            <a:pPr lvl="0"/>
+            <a:r>
+              <a:rPr lang="en-US" sz="1200" kern="1200" smtClean="0">
+                <a:solidFill>
+                  <a:schemeClr val="tx1"/>
+                </a:solidFill>
+                <a:effectLst/>
+                <a:latin typeface="+mn-lt"/>
+                <a:ea typeface="+mn-ea"/>
+                <a:cs typeface="+mn-cs"/>
+              </a:rPr>
+              <a:t>Junit: kiểm thử các hàm trong code.</a:t>
+            </a:r>
+          </a:p>
+          <a:p>
+            <a:r>
+              <a:rPr lang="en-US" sz="1200" kern="1200" smtClean="0">
+                <a:solidFill>
+                  <a:schemeClr val="tx1"/>
+                </a:solidFill>
+                <a:effectLst/>
+                <a:latin typeface="+mn-lt"/>
+                <a:ea typeface="+mn-ea"/>
+                <a:cs typeface="+mn-cs"/>
+              </a:rPr>
+              <a:t>Quick Test Pro: kiểm thử tích hợp, giao diện, v.v</a:t>
+            </a:r>
+            <a:endParaRPr lang="en-US"/>
+          </a:p>
+        </p:txBody>
+      </p:sp>
+      <p:sp>
+        <p:nvSpPr>
+          <p:cNvPr id="4" name="Slide Number Placeholder 3"/>
+          <p:cNvSpPr>
+            <a:spLocks noGrp="1"/>
+          </p:cNvSpPr>
+          <p:nvPr>
+            <p:ph type="sldNum" sz="quarter" idx="10"/>
+          </p:nvPr>
+        </p:nvSpPr>
+        <p:spPr/>
+        <p:txBody>
+          <a:bodyPr/>
+          <a:lstStyle/>
+          <a:p>
+            <a:fld id="{90E8D240-C9F8-4409-902E-7350E5949E59}" type="slidenum">
+              <a:rPr lang="en-US" smtClean="0"/>
+              <a:t>5</a:t>
+            </a:fld>
+            <a:endParaRPr lang="en-US"/>
+          </a:p>
+        </p:txBody>
+      </p:sp>
+    </p:spTree>
+    <p:extLst>
+      <p:ext uri="{BB962C8B-B14F-4D97-AF65-F5344CB8AC3E}">
+        <p14:creationId xmlns:p14="http://schemas.microsoft.com/office/powerpoint/2010/main" val="11411023"/>
+      </p:ext>
+    </p:extLst>
+  </p:cSld>
+  <p:clrMapOvr>
+    <a:masterClrMapping/>
+  </p:clrMapOvr>
+</p:notes>
+</file>
+
+<file path=ppt/notesSlides/notesSlide3.xml><?xml version="1.0" encoding="utf-8"?>
+<p:notes xmlns:a="http://schemas.openxmlformats.org/drawingml/2006/main" xmlns:r="http://schemas.openxmlformats.org/officeDocument/2006/relationships" xmlns:p="http://schemas.openxmlformats.org/presentationml/2006/main">
+  <p:cSld>
+    <p:spTree>
+      <p:nvGrpSpPr>
+        <p:cNvPr id="1" name=""/>
+        <p:cNvGrpSpPr/>
+        <p:nvPr/>
+      </p:nvGrpSpPr>
+      <p:grpSpPr>
+        <a:xfrm>
+          <a:off x="0" y="0"/>
+          <a:ext cx="0" cy="0"/>
+          <a:chOff x="0" y="0"/>
+          <a:chExt cx="0" cy="0"/>
+        </a:xfrm>
+      </p:grpSpPr>
+      <p:sp>
+        <p:nvSpPr>
+          <p:cNvPr id="2" name="Slide Image Placeholder 1"/>
+          <p:cNvSpPr>
+            <a:spLocks noGrp="1" noRot="1" noChangeAspect="1"/>
+          </p:cNvSpPr>
+          <p:nvPr>
+            <p:ph type="sldImg"/>
+          </p:nvPr>
+        </p:nvSpPr>
+        <p:spPr/>
+      </p:sp>
+      <p:sp>
+        <p:nvSpPr>
+          <p:cNvPr id="3" name="Notes Placeholder 2"/>
+          <p:cNvSpPr>
+            <a:spLocks noGrp="1"/>
+          </p:cNvSpPr>
+          <p:nvPr>
+            <p:ph type="body" idx="1"/>
+          </p:nvPr>
+        </p:nvSpPr>
+        <p:spPr/>
+        <p:txBody>
+          <a:bodyPr/>
+          <a:lstStyle/>
+          <a:p>
+            <a:endParaRPr lang="en-US"/>
+          </a:p>
+        </p:txBody>
+      </p:sp>
+      <p:sp>
+        <p:nvSpPr>
+          <p:cNvPr id="4" name="Slide Number Placeholder 3"/>
+          <p:cNvSpPr>
+            <a:spLocks noGrp="1"/>
+          </p:cNvSpPr>
+          <p:nvPr>
+            <p:ph type="sldNum" sz="quarter" idx="10"/>
+          </p:nvPr>
+        </p:nvSpPr>
+        <p:spPr/>
+        <p:txBody>
+          <a:bodyPr/>
+          <a:lstStyle/>
+          <a:p>
+            <a:fld id="{90E8D240-C9F8-4409-902E-7350E5949E59}" type="slidenum">
+              <a:rPr lang="en-US" smtClean="0"/>
+              <a:t>10</a:t>
+            </a:fld>
+            <a:endParaRPr lang="en-US"/>
+          </a:p>
+        </p:txBody>
+      </p:sp>
+    </p:spTree>
+    <p:extLst>
+      <p:ext uri="{BB962C8B-B14F-4D97-AF65-F5344CB8AC3E}">
+        <p14:creationId xmlns:p14="http://schemas.microsoft.com/office/powerpoint/2010/main" val="412105458"/>
+      </p:ext>
+    </p:extLst>
+  </p:cSld>
+  <p:clrMapOvr>
+    <a:masterClrMapping/>
+  </p:clrMapOvr>
+</p:notes>
+</file>
+
+<file path=ppt/notesSlides/notesSlide4.xml><?xml version="1.0" encoding="utf-8"?>
+<p:notes xmlns:a="http://schemas.openxmlformats.org/drawingml/2006/main" xmlns:r="http://schemas.openxmlformats.org/officeDocument/2006/relationships" xmlns:p="http://schemas.openxmlformats.org/presentationml/2006/main">
+  <p:cSld>
+    <p:spTree>
+      <p:nvGrpSpPr>
+        <p:cNvPr id="1" name=""/>
+        <p:cNvGrpSpPr/>
+        <p:nvPr/>
+      </p:nvGrpSpPr>
+      <p:grpSpPr>
+        <a:xfrm>
+          <a:off x="0" y="0"/>
+          <a:ext cx="0" cy="0"/>
+          <a:chOff x="0" y="0"/>
+          <a:chExt cx="0" cy="0"/>
+        </a:xfrm>
+      </p:grpSpPr>
+      <p:sp>
+        <p:nvSpPr>
+          <p:cNvPr id="2" name="Slide Image Placeholder 1"/>
+          <p:cNvSpPr>
+            <a:spLocks noGrp="1" noRot="1" noChangeAspect="1"/>
+          </p:cNvSpPr>
+          <p:nvPr>
+            <p:ph type="sldImg"/>
+          </p:nvPr>
+        </p:nvSpPr>
+        <p:spPr/>
+      </p:sp>
+      <p:sp>
+        <p:nvSpPr>
+          <p:cNvPr id="3" name="Notes Placeholder 2"/>
+          <p:cNvSpPr>
+            <a:spLocks noGrp="1"/>
+          </p:cNvSpPr>
+          <p:nvPr>
+            <p:ph type="body" idx="1"/>
+          </p:nvPr>
+        </p:nvSpPr>
+        <p:spPr/>
+        <p:txBody>
+          <a:bodyPr/>
+          <a:lstStyle/>
+          <a:p>
+            <a:pPr lvl="0"/>
+            <a:r>
+              <a:rPr lang="en-US" smtClean="0"/>
+              <a:t>Mục tiêu cụ thể:</a:t>
+            </a:r>
+          </a:p>
+          <a:p>
+            <a:pPr lvl="1"/>
+            <a:r>
+              <a:rPr lang="vi-VN" smtClean="0"/>
+              <a:t>Phân tích và thiết kế website cung cấp thông tin, tìm kiếm nhà trọ tại thành phố Cần Thơ. Trong đó chú trọng tính tối ưu của cơ sở dữ liệu, tối ưu giao diện nhanh hơn. Thiết kế giao diện làm sao cho người xem tập trung vào chức năng tìm kiếm thông tin, không bị loãn</a:t>
+            </a:r>
+            <a:r>
+              <a:rPr lang="en-US" smtClean="0"/>
+              <a:t>g</a:t>
+            </a:r>
+            <a:r>
+              <a:rPr lang="vi-VN" smtClean="0"/>
+              <a:t> thông tin.</a:t>
+            </a:r>
+            <a:endParaRPr lang="en-US" smtClean="0"/>
+          </a:p>
+          <a:p>
+            <a:pPr lvl="1"/>
+            <a:r>
+              <a:rPr lang="vi-VN" smtClean="0"/>
+              <a:t>Cài đặt website tìm kiếm nhà trọ thành phố Cần Thơ. Sử dụng các công nghệ hoặc dịch vụ mới hiện nay bao gồm: Google Maps</a:t>
+            </a:r>
+            <a:r>
+              <a:rPr lang="en-US" smtClean="0"/>
+              <a:t>, Sping, Hibernate</a:t>
+            </a:r>
+            <a:r>
+              <a:rPr lang="vi-VN" smtClean="0"/>
+              <a:t>.</a:t>
+            </a:r>
+            <a:endParaRPr lang="en-US" smtClean="0"/>
+          </a:p>
+          <a:p>
+            <a:endParaRPr lang="en-US"/>
+          </a:p>
+        </p:txBody>
+      </p:sp>
+      <p:sp>
+        <p:nvSpPr>
+          <p:cNvPr id="4" name="Slide Number Placeholder 3"/>
+          <p:cNvSpPr>
+            <a:spLocks noGrp="1"/>
+          </p:cNvSpPr>
+          <p:nvPr>
+            <p:ph type="sldNum" sz="quarter" idx="10"/>
+          </p:nvPr>
+        </p:nvSpPr>
+        <p:spPr/>
+        <p:txBody>
+          <a:bodyPr/>
+          <a:lstStyle/>
+          <a:p>
+            <a:fld id="{90E8D240-C9F8-4409-902E-7350E5949E59}" type="slidenum">
+              <a:rPr lang="en-US" smtClean="0"/>
+              <a:t>12</a:t>
+            </a:fld>
+            <a:endParaRPr lang="en-US"/>
+          </a:p>
+        </p:txBody>
+      </p:sp>
+    </p:spTree>
+    <p:extLst>
+      <p:ext uri="{BB962C8B-B14F-4D97-AF65-F5344CB8AC3E}">
+        <p14:creationId xmlns:p14="http://schemas.microsoft.com/office/powerpoint/2010/main" val="1664519907"/>
+      </p:ext>
+    </p:extLst>
+  </p:cSld>
+  <p:clrMapOvr>
+    <a:masterClrMapping/>
+  </p:clrMapOvr>
+</p:notes>
+</file>
+
+<file path=ppt/notesSlides/notesSlide5.xml><?xml version="1.0" encoding="utf-8"?>
+<p:notes xmlns:a="http://schemas.openxmlformats.org/drawingml/2006/main" xmlns:r="http://schemas.openxmlformats.org/officeDocument/2006/relationships" xmlns:p="http://schemas.openxmlformats.org/presentationml/2006/main">
+  <p:cSld>
+    <p:spTree>
+      <p:nvGrpSpPr>
+        <p:cNvPr id="1" name=""/>
+        <p:cNvGrpSpPr/>
+        <p:nvPr/>
+      </p:nvGrpSpPr>
+      <p:grpSpPr>
+        <a:xfrm>
+          <a:off x="0" y="0"/>
+          <a:ext cx="0" cy="0"/>
+          <a:chOff x="0" y="0"/>
+          <a:chExt cx="0" cy="0"/>
+        </a:xfrm>
+      </p:grpSpPr>
+      <p:sp>
+        <p:nvSpPr>
+          <p:cNvPr id="2" name="Slide Image Placeholder 1"/>
+          <p:cNvSpPr>
+            <a:spLocks noGrp="1" noRot="1" noChangeAspect="1"/>
+          </p:cNvSpPr>
+          <p:nvPr>
+            <p:ph type="sldImg"/>
+          </p:nvPr>
+        </p:nvSpPr>
+        <p:spPr/>
+      </p:sp>
+      <p:sp>
+        <p:nvSpPr>
+          <p:cNvPr id="3" name="Notes Placeholder 2"/>
+          <p:cNvSpPr>
+            <a:spLocks noGrp="1"/>
+          </p:cNvSpPr>
+          <p:nvPr>
+            <p:ph type="body" idx="1"/>
+          </p:nvPr>
+        </p:nvSpPr>
+        <p:spPr/>
+        <p:txBody>
+          <a:bodyPr/>
+          <a:lstStyle/>
+          <a:p>
+            <a:r>
+              <a:rPr lang="en-US" sz="1200" b="1" kern="1200" smtClean="0">
+                <a:solidFill>
+                  <a:schemeClr val="tx1"/>
+                </a:solidFill>
+                <a:effectLst/>
+                <a:latin typeface="+mn-lt"/>
+                <a:ea typeface="+mn-ea"/>
+                <a:cs typeface="+mn-cs"/>
+              </a:rPr>
+              <a:t>Nhóm người dùng tự do</a:t>
+            </a:r>
+            <a:r>
+              <a:rPr lang="en-US" sz="1200" kern="1200" smtClean="0">
+                <a:solidFill>
+                  <a:schemeClr val="tx1"/>
+                </a:solidFill>
+                <a:effectLst/>
+                <a:latin typeface="+mn-lt"/>
+                <a:ea typeface="+mn-ea"/>
+                <a:cs typeface="+mn-cs"/>
+              </a:rPr>
+              <a:t>: là những người dùng không có tài khoản trong hệ thống hoặc có tài khoản nhưng không đăng nhập vào hệ thống. Nhóm người dùng này có thể tìm kiếm và xem nhà trọ nhưng không được đăng nhà trọ, like, bình luận nhà trọ và không có quyền xác nhận hay xóa các thành viên.</a:t>
+            </a:r>
+          </a:p>
+          <a:p>
+            <a:r>
+              <a:rPr lang="en-US" sz="1200" b="1" kern="1200" smtClean="0">
+                <a:solidFill>
+                  <a:schemeClr val="tx1"/>
+                </a:solidFill>
+                <a:effectLst/>
+                <a:latin typeface="+mn-lt"/>
+                <a:ea typeface="+mn-ea"/>
+                <a:cs typeface="+mn-cs"/>
+              </a:rPr>
+              <a:t>Nhóm người dùng thành viên</a:t>
+            </a:r>
+            <a:r>
+              <a:rPr lang="en-US" sz="1200" kern="1200" smtClean="0">
+                <a:solidFill>
+                  <a:schemeClr val="tx1"/>
+                </a:solidFill>
+                <a:effectLst/>
+                <a:latin typeface="+mn-lt"/>
+                <a:ea typeface="+mn-ea"/>
+                <a:cs typeface="+mn-cs"/>
+              </a:rPr>
+              <a:t>: là những người có tài khoản trong hệ thống và đã đăng nhập thành công vào hệ thống. Nhóm người dùng này có các quyền như người dùng tự do, ngoài ra còn có thể đăng nhà trọ, like và bình luận trên trang nhà trọ, quản lý các nhà trọ của mình đã đăng, cập nhật lại thông tin phòng trọ của mình đã đăng, thay đổi mật khẩu của tài khoản của mình.</a:t>
+            </a:r>
+          </a:p>
+          <a:p>
+            <a:r>
+              <a:rPr lang="en-US" sz="1200" b="1" kern="1200" smtClean="0">
+                <a:solidFill>
+                  <a:schemeClr val="tx1"/>
+                </a:solidFill>
+                <a:effectLst/>
+                <a:latin typeface="+mn-lt"/>
+                <a:ea typeface="+mn-ea"/>
+                <a:cs typeface="+mn-cs"/>
+              </a:rPr>
+              <a:t>Nhóm người dùng admin</a:t>
+            </a:r>
+            <a:r>
+              <a:rPr lang="en-US" sz="1200" kern="1200" smtClean="0">
+                <a:solidFill>
+                  <a:schemeClr val="tx1"/>
+                </a:solidFill>
+                <a:effectLst/>
+                <a:latin typeface="+mn-lt"/>
+                <a:ea typeface="+mn-ea"/>
+                <a:cs typeface="+mn-cs"/>
+              </a:rPr>
+              <a:t>: là người quản trị hệ thống, quản lý đảm bảo thông tin về nhà trọ trên hệ thống chính xác nhất có thể. Nhóm người dùng này cũng có thể đăng nhà trọ, xác nhận hoặc không xác nhận các yêu cầu đăng tin từ nhóm người dùng thành viên. Ngoài ra còn có thể xóa thành viên và các nhà trọ của thành viên đó nếu phát hiện thành viên có hoạt động tiêu cực như bình luận từ ngữ thô tục hoặc đăng nhà trọ ma. Tuy nhiên nhóm người dùng này không được quyền sửa thông tin của nhà trọ cũng như thông tin của nhóm người dùng thành viên đăng.</a:t>
+            </a:r>
+            <a:endParaRPr lang="en-US" sz="1200" kern="1200">
+              <a:solidFill>
+                <a:schemeClr val="tx1"/>
+              </a:solidFill>
+              <a:effectLst/>
+              <a:latin typeface="+mn-lt"/>
+              <a:ea typeface="+mn-ea"/>
+              <a:cs typeface="+mn-cs"/>
+            </a:endParaRPr>
+          </a:p>
+        </p:txBody>
+      </p:sp>
+      <p:sp>
+        <p:nvSpPr>
+          <p:cNvPr id="4" name="Slide Number Placeholder 3"/>
+          <p:cNvSpPr>
+            <a:spLocks noGrp="1"/>
+          </p:cNvSpPr>
+          <p:nvPr>
+            <p:ph type="sldNum" sz="quarter" idx="10"/>
+          </p:nvPr>
+        </p:nvSpPr>
+        <p:spPr/>
+        <p:txBody>
+          <a:bodyPr/>
+          <a:lstStyle/>
+          <a:p>
+            <a:fld id="{90E8D240-C9F8-4409-902E-7350E5949E59}" type="slidenum">
+              <a:rPr lang="en-US" smtClean="0"/>
+              <a:t>13</a:t>
+            </a:fld>
+            <a:endParaRPr lang="en-US"/>
+          </a:p>
+        </p:txBody>
+      </p:sp>
+    </p:spTree>
+    <p:extLst>
+      <p:ext uri="{BB962C8B-B14F-4D97-AF65-F5344CB8AC3E}">
+        <p14:creationId xmlns:p14="http://schemas.microsoft.com/office/powerpoint/2010/main" val="2959175939"/>
+      </p:ext>
+    </p:extLst>
+  </p:cSld>
+  <p:clrMapOvr>
+    <a:masterClrMapping/>
+  </p:clrMapOvr>
+</p:notes>
+</file>
+
 <file path=ppt/slideLayouts/slideLayout1.xml><?xml version="1.0" encoding="utf-8"?>
 <p:sldLayout xmlns:a="http://schemas.openxmlformats.org/drawingml/2006/main" xmlns:r="http://schemas.openxmlformats.org/officeDocument/2006/relationships" xmlns:p="http://schemas.openxmlformats.org/presentationml/2006/main" type="title" preserve="1">
   <p:cSld name="Title Slide">
@@ -9990,15 +11352,75 @@
           </p:nvPr>
         </p:nvPicPr>
         <p:blipFill>
-          <a:blip r:embed="rId2"/>
+          <a:blip r:embed="rId3"/>
           <a:stretch>
             <a:fillRect/>
           </a:stretch>
         </p:blipFill>
         <p:spPr>
           <a:xfrm>
-            <a:off x="3846979" y="1489633"/>
+            <a:off x="5574180" y="1444478"/>
             <a:ext cx="4498043" cy="4909011"/>
+          </a:xfrm>
+          <a:prstGeom prst="rect">
+            <a:avLst/>
+          </a:prstGeom>
+        </p:spPr>
+      </p:pic>
+      <p:pic>
+        <p:nvPicPr>
+          <p:cNvPr id="2" name="Picture 1"/>
+          <p:cNvPicPr>
+            <a:picLocks noChangeAspect="1"/>
+          </p:cNvPicPr>
+          <p:nvPr/>
+        </p:nvPicPr>
+        <p:blipFill>
+          <a:blip r:embed="rId4">
+            <a:extLst>
+              <a:ext uri="{28A0092B-C50C-407E-A947-70E740481C1C}">
+                <a14:useLocalDpi xmlns:a14="http://schemas.microsoft.com/office/drawing/2010/main" val="0"/>
+              </a:ext>
+            </a:extLst>
+          </a:blip>
+          <a:stretch>
+            <a:fillRect/>
+          </a:stretch>
+        </p:blipFill>
+        <p:spPr>
+          <a:xfrm>
+            <a:off x="2276829" y="1850741"/>
+            <a:ext cx="2400300" cy="1428750"/>
+          </a:xfrm>
+          <a:prstGeom prst="rect">
+            <a:avLst/>
+          </a:prstGeom>
+        </p:spPr>
+      </p:pic>
+      <p:pic>
+        <p:nvPicPr>
+          <p:cNvPr id="5" name="Picture 4"/>
+          <p:cNvPicPr>
+            <a:picLocks noChangeAspect="1"/>
+          </p:cNvPicPr>
+          <p:nvPr/>
+        </p:nvPicPr>
+        <p:blipFill>
+          <a:blip r:embed="rId5" cstate="print">
+            <a:extLst>
+              <a:ext uri="{28A0092B-C50C-407E-A947-70E740481C1C}">
+                <a14:useLocalDpi xmlns:a14="http://schemas.microsoft.com/office/drawing/2010/main" val="0"/>
+              </a:ext>
+            </a:extLst>
+          </a:blip>
+          <a:stretch>
+            <a:fillRect/>
+          </a:stretch>
+        </p:blipFill>
+        <p:spPr>
+          <a:xfrm>
+            <a:off x="1727201" y="4730864"/>
+            <a:ext cx="3499557" cy="971343"/>
           </a:xfrm>
           <a:prstGeom prst="rect">
             <a:avLst/>
@@ -10159,6 +11581,619 @@
           <a:p>
             <a:r>
               <a:rPr lang="en-US" smtClean="0"/>
+              <a:t>Website thông tin nhà trọ</a:t>
+            </a:r>
+            <a:endParaRPr lang="en-US"/>
+          </a:p>
+        </p:txBody>
+      </p:sp>
+      <p:sp>
+        <p:nvSpPr>
+          <p:cNvPr id="13" name="Text Placeholder 12"/>
+          <p:cNvSpPr>
+            <a:spLocks noGrp="1"/>
+          </p:cNvSpPr>
+          <p:nvPr>
+            <p:ph type="body" idx="1"/>
+          </p:nvPr>
+        </p:nvSpPr>
+        <p:spPr/>
+        <p:txBody>
+          <a:bodyPr/>
+          <a:lstStyle/>
+          <a:p>
+            <a:r>
+              <a:rPr lang="en-US" smtClean="0"/>
+              <a:t>Mục tiêu</a:t>
+            </a:r>
+            <a:endParaRPr lang="en-US"/>
+          </a:p>
+        </p:txBody>
+      </p:sp>
+      <p:sp>
+        <p:nvSpPr>
+          <p:cNvPr id="5" name="Content Placeholder 4"/>
+          <p:cNvSpPr>
+            <a:spLocks noGrp="1"/>
+          </p:cNvSpPr>
+          <p:nvPr>
+            <p:ph sz="half" idx="2"/>
+          </p:nvPr>
+        </p:nvSpPr>
+        <p:spPr>
+          <a:xfrm>
+            <a:off x="839788" y="2505075"/>
+            <a:ext cx="10514012" cy="3684588"/>
+          </a:xfrm>
+        </p:spPr>
+        <p:txBody>
+          <a:bodyPr/>
+          <a:lstStyle/>
+          <a:p>
+            <a:pPr marL="0" lvl="0" indent="0">
+              <a:buNone/>
+            </a:pPr>
+            <a:r>
+              <a:rPr lang="en-US" b="1" smtClean="0"/>
+              <a:t>“</a:t>
+            </a:r>
+            <a:r>
+              <a:rPr lang="en-US" b="1"/>
+              <a:t>Website thông tin nhà trọ”</a:t>
+            </a:r>
+            <a:r>
+              <a:rPr lang="en-US"/>
+              <a:t> </a:t>
+            </a:r>
+            <a:r>
+              <a:rPr lang="vi-VN"/>
+              <a:t>là hỗ trợ sinh viên  cũng như người lao động ở xa tìm kiếm nhà trọ trong suốt quá trong quá trình học tập và làm việc ở thành phố Cần </a:t>
+            </a:r>
+            <a:r>
+              <a:rPr lang="vi-VN"/>
+              <a:t>Thơ</a:t>
+            </a:r>
+            <a:r>
+              <a:rPr lang="vi-VN" smtClean="0"/>
+              <a:t>.</a:t>
+            </a:r>
+            <a:endParaRPr lang="en-US"/>
+          </a:p>
+        </p:txBody>
+      </p:sp>
+      <p:pic>
+        <p:nvPicPr>
+          <p:cNvPr id="10" name="Picture 9"/>
+          <p:cNvPicPr>
+            <a:picLocks noChangeAspect="1"/>
+          </p:cNvPicPr>
+          <p:nvPr/>
+        </p:nvPicPr>
+        <p:blipFill>
+          <a:blip r:embed="rId3" cstate="print">
+            <a:extLst>
+              <a:ext uri="{28A0092B-C50C-407E-A947-70E740481C1C}">
+                <a14:useLocalDpi xmlns:a14="http://schemas.microsoft.com/office/drawing/2010/main" val="0"/>
+              </a:ext>
+            </a:extLst>
+          </a:blip>
+          <a:stretch>
+            <a:fillRect/>
+          </a:stretch>
+        </p:blipFill>
+        <p:spPr>
+          <a:xfrm>
+            <a:off x="838200" y="3989003"/>
+            <a:ext cx="2096911" cy="2096911"/>
+          </a:xfrm>
+          <a:prstGeom prst="rect">
+            <a:avLst/>
+          </a:prstGeom>
+        </p:spPr>
+      </p:pic>
+      <p:grpSp>
+        <p:nvGrpSpPr>
+          <p:cNvPr id="14" name="Group 13"/>
+          <p:cNvGrpSpPr/>
+          <p:nvPr/>
+        </p:nvGrpSpPr>
+        <p:grpSpPr>
+          <a:xfrm>
+            <a:off x="4640575" y="3989003"/>
+            <a:ext cx="6713225" cy="2200660"/>
+            <a:chOff x="4013537" y="3989003"/>
+            <a:chExt cx="6713225" cy="2200660"/>
+          </a:xfrm>
+        </p:grpSpPr>
+        <p:pic>
+          <p:nvPicPr>
+            <p:cNvPr id="11" name="Picture 10"/>
+            <p:cNvPicPr>
+              <a:picLocks noChangeAspect="1"/>
+            </p:cNvPicPr>
+            <p:nvPr/>
+          </p:nvPicPr>
+          <p:blipFill>
+            <a:blip r:embed="rId4" cstate="print">
+              <a:extLst>
+                <a:ext uri="{28A0092B-C50C-407E-A947-70E740481C1C}">
+                  <a14:useLocalDpi xmlns:a14="http://schemas.microsoft.com/office/drawing/2010/main" val="0"/>
+                </a:ext>
+              </a:extLst>
+            </a:blip>
+            <a:stretch>
+              <a:fillRect/>
+            </a:stretch>
+          </p:blipFill>
+          <p:spPr>
+            <a:xfrm>
+              <a:off x="4013537" y="3989003"/>
+              <a:ext cx="2200660" cy="2200660"/>
+            </a:xfrm>
+            <a:prstGeom prst="rect">
+              <a:avLst/>
+            </a:prstGeom>
+          </p:spPr>
+        </p:pic>
+        <p:sp>
+          <p:nvSpPr>
+            <p:cNvPr id="12" name="TextBox 11"/>
+            <p:cNvSpPr txBox="1"/>
+            <p:nvPr/>
+          </p:nvSpPr>
+          <p:spPr>
+            <a:xfrm>
+              <a:off x="6310488" y="4652737"/>
+              <a:ext cx="4416274" cy="769441"/>
+            </a:xfrm>
+            <a:prstGeom prst="rect">
+              <a:avLst/>
+            </a:prstGeom>
+            <a:noFill/>
+          </p:spPr>
+          <p:txBody>
+            <a:bodyPr wrap="none" rtlCol="0">
+              <a:spAutoFit/>
+            </a:bodyPr>
+            <a:lstStyle/>
+            <a:p>
+              <a:r>
+                <a:rPr lang="en-US" sz="4400" smtClean="0">
+                  <a:solidFill>
+                    <a:schemeClr val="bg1">
+                      <a:lumMod val="65000"/>
+                    </a:schemeClr>
+                  </a:solidFill>
+                  <a:latin typeface="Helvetica" pitchFamily="50" charset="0"/>
+                  <a:ea typeface="Helvetica" pitchFamily="50" charset="0"/>
+                  <a:cs typeface="Helvetica" pitchFamily="50" charset="0"/>
+                </a:rPr>
+                <a:t>Nhà trọ </a:t>
+              </a:r>
+              <a:r>
+                <a:rPr lang="en-US" sz="4400" smtClean="0">
+                  <a:latin typeface="Helvetica" pitchFamily="50" charset="0"/>
+                  <a:ea typeface="Helvetica" pitchFamily="50" charset="0"/>
+                  <a:cs typeface="Helvetica" pitchFamily="50" charset="0"/>
+                </a:rPr>
+                <a:t>Cần Thơ</a:t>
+              </a:r>
+              <a:endParaRPr lang="en-US" sz="4400">
+                <a:latin typeface="Helvetica" pitchFamily="50" charset="0"/>
+                <a:ea typeface="Helvetica" pitchFamily="50" charset="0"/>
+                <a:cs typeface="Helvetica" pitchFamily="50" charset="0"/>
+              </a:endParaRPr>
+            </a:p>
+          </p:txBody>
+        </p:sp>
+      </p:grpSp>
+    </p:spTree>
+    <p:extLst>
+      <p:ext uri="{BB962C8B-B14F-4D97-AF65-F5344CB8AC3E}">
+        <p14:creationId xmlns:p14="http://schemas.microsoft.com/office/powerpoint/2010/main" val="4243196922"/>
+      </p:ext>
+    </p:extLst>
+  </p:cSld>
+  <p:clrMapOvr>
+    <a:masterClrMapping/>
+  </p:clrMapOvr>
+  <p:timing>
+    <p:tnLst>
+      <p:par>
+        <p:cTn id="1" dur="indefinite" restart="never" nodeType="tmRoot"/>
+      </p:par>
+    </p:tnLst>
+  </p:timing>
+</p:sld>
+</file>
+
+<file path=ppt/slides/slide13.xml><?xml version="1.0" encoding="utf-8"?>
+<p:sld xmlns:a="http://schemas.openxmlformats.org/drawingml/2006/main" xmlns:r="http://schemas.openxmlformats.org/officeDocument/2006/relationships" xmlns:p="http://schemas.openxmlformats.org/presentationml/2006/main">
+  <p:cSld>
+    <p:spTree>
+      <p:nvGrpSpPr>
+        <p:cNvPr id="1" name=""/>
+        <p:cNvGrpSpPr/>
+        <p:nvPr/>
+      </p:nvGrpSpPr>
+      <p:grpSpPr>
+        <a:xfrm>
+          <a:off x="0" y="0"/>
+          <a:ext cx="0" cy="0"/>
+          <a:chOff x="0" y="0"/>
+          <a:chExt cx="0" cy="0"/>
+        </a:xfrm>
+      </p:grpSpPr>
+      <p:sp>
+        <p:nvSpPr>
+          <p:cNvPr id="7" name="Title 6"/>
+          <p:cNvSpPr>
+            <a:spLocks noGrp="1"/>
+          </p:cNvSpPr>
+          <p:nvPr>
+            <p:ph type="title"/>
+          </p:nvPr>
+        </p:nvSpPr>
+        <p:spPr/>
+        <p:txBody>
+          <a:bodyPr/>
+          <a:lstStyle/>
+          <a:p>
+            <a:r>
+              <a:rPr lang="en-US" smtClean="0"/>
+              <a:t>Website thông tin nhà trọ</a:t>
+            </a:r>
+            <a:endParaRPr lang="en-US"/>
+          </a:p>
+        </p:txBody>
+      </p:sp>
+      <p:sp>
+        <p:nvSpPr>
+          <p:cNvPr id="21" name="Text Placeholder 20"/>
+          <p:cNvSpPr>
+            <a:spLocks noGrp="1"/>
+          </p:cNvSpPr>
+          <p:nvPr>
+            <p:ph type="body" idx="1"/>
+          </p:nvPr>
+        </p:nvSpPr>
+        <p:spPr/>
+        <p:txBody>
+          <a:bodyPr/>
+          <a:lstStyle/>
+          <a:p>
+            <a:r>
+              <a:rPr lang="en-US" smtClean="0"/>
+              <a:t>Nhóm người dùng</a:t>
+            </a:r>
+            <a:endParaRPr lang="en-US"/>
+          </a:p>
+        </p:txBody>
+      </p:sp>
+      <p:sp>
+        <p:nvSpPr>
+          <p:cNvPr id="22" name="Content Placeholder 21"/>
+          <p:cNvSpPr>
+            <a:spLocks noGrp="1"/>
+          </p:cNvSpPr>
+          <p:nvPr>
+            <p:ph sz="half" idx="2"/>
+          </p:nvPr>
+        </p:nvSpPr>
+        <p:spPr/>
+        <p:txBody>
+          <a:bodyPr/>
+          <a:lstStyle/>
+          <a:p>
+            <a:endParaRPr lang="en-US"/>
+          </a:p>
+        </p:txBody>
+      </p:sp>
+      <p:grpSp>
+        <p:nvGrpSpPr>
+          <p:cNvPr id="18" name="Group 17"/>
+          <p:cNvGrpSpPr/>
+          <p:nvPr/>
+        </p:nvGrpSpPr>
+        <p:grpSpPr>
+          <a:xfrm>
+            <a:off x="945895" y="2857499"/>
+            <a:ext cx="2488793" cy="3138781"/>
+            <a:chOff x="945895" y="2857499"/>
+            <a:chExt cx="2488793" cy="3138781"/>
+          </a:xfrm>
+        </p:grpSpPr>
+        <p:pic>
+          <p:nvPicPr>
+            <p:cNvPr id="9" name="Picture 8"/>
+            <p:cNvPicPr>
+              <a:picLocks noChangeAspect="1"/>
+            </p:cNvPicPr>
+            <p:nvPr/>
+          </p:nvPicPr>
+          <p:blipFill>
+            <a:blip r:embed="rId3">
+              <a:duotone>
+                <a:schemeClr val="accent5">
+                  <a:shade val="45000"/>
+                  <a:satMod val="135000"/>
+                </a:schemeClr>
+                <a:prstClr val="white"/>
+              </a:duotone>
+              <a:extLst>
+                <a:ext uri="{28A0092B-C50C-407E-A947-70E740481C1C}">
+                  <a14:useLocalDpi xmlns:a14="http://schemas.microsoft.com/office/drawing/2010/main" val="0"/>
+                </a:ext>
+              </a:extLst>
+            </a:blip>
+            <a:stretch>
+              <a:fillRect/>
+            </a:stretch>
+          </p:blipFill>
+          <p:spPr>
+            <a:xfrm>
+              <a:off x="945895" y="2857499"/>
+              <a:ext cx="2488793" cy="2488793"/>
+            </a:xfrm>
+            <a:prstGeom prst="rect">
+              <a:avLst/>
+            </a:prstGeom>
+          </p:spPr>
+        </p:pic>
+        <p:sp>
+          <p:nvSpPr>
+            <p:cNvPr id="4" name="TextBox 3"/>
+            <p:cNvSpPr txBox="1"/>
+            <p:nvPr/>
+          </p:nvSpPr>
+          <p:spPr>
+            <a:xfrm>
+              <a:off x="1689193" y="5534615"/>
+              <a:ext cx="1002197" cy="461665"/>
+            </a:xfrm>
+            <a:prstGeom prst="rect">
+              <a:avLst/>
+            </a:prstGeom>
+            <a:noFill/>
+          </p:spPr>
+          <p:txBody>
+            <a:bodyPr wrap="none" rtlCol="0">
+              <a:spAutoFit/>
+            </a:bodyPr>
+            <a:lstStyle/>
+            <a:p>
+              <a:r>
+                <a:rPr lang="en-US" sz="2400" smtClean="0"/>
+                <a:t>Admin</a:t>
+              </a:r>
+              <a:endParaRPr lang="en-US" sz="2400"/>
+            </a:p>
+          </p:txBody>
+        </p:sp>
+      </p:grpSp>
+      <p:grpSp>
+        <p:nvGrpSpPr>
+          <p:cNvPr id="19" name="Group 18"/>
+          <p:cNvGrpSpPr/>
+          <p:nvPr/>
+        </p:nvGrpSpPr>
+        <p:grpSpPr>
+          <a:xfrm>
+            <a:off x="4905451" y="2857499"/>
+            <a:ext cx="2488793" cy="3138781"/>
+            <a:chOff x="4850016" y="2857499"/>
+            <a:chExt cx="2488793" cy="3138781"/>
+          </a:xfrm>
+        </p:grpSpPr>
+        <p:pic>
+          <p:nvPicPr>
+            <p:cNvPr id="13" name="Picture 12"/>
+            <p:cNvPicPr>
+              <a:picLocks noChangeAspect="1"/>
+            </p:cNvPicPr>
+            <p:nvPr/>
+          </p:nvPicPr>
+          <p:blipFill>
+            <a:blip r:embed="rId3">
+              <a:duotone>
+                <a:schemeClr val="accent3">
+                  <a:shade val="45000"/>
+                  <a:satMod val="135000"/>
+                </a:schemeClr>
+                <a:prstClr val="white"/>
+              </a:duotone>
+              <a:extLst>
+                <a:ext uri="{28A0092B-C50C-407E-A947-70E740481C1C}">
+                  <a14:useLocalDpi xmlns:a14="http://schemas.microsoft.com/office/drawing/2010/main" val="0"/>
+                </a:ext>
+              </a:extLst>
+            </a:blip>
+            <a:stretch>
+              <a:fillRect/>
+            </a:stretch>
+          </p:blipFill>
+          <p:spPr>
+            <a:xfrm>
+              <a:off x="4850016" y="2857499"/>
+              <a:ext cx="2488793" cy="2488793"/>
+            </a:xfrm>
+            <a:prstGeom prst="rect">
+              <a:avLst/>
+            </a:prstGeom>
+          </p:spPr>
+        </p:pic>
+        <p:sp>
+          <p:nvSpPr>
+            <p:cNvPr id="15" name="TextBox 14"/>
+            <p:cNvSpPr txBox="1"/>
+            <p:nvPr/>
+          </p:nvSpPr>
+          <p:spPr>
+            <a:xfrm>
+              <a:off x="5312788" y="5534615"/>
+              <a:ext cx="1563248" cy="461665"/>
+            </a:xfrm>
+            <a:prstGeom prst="rect">
+              <a:avLst/>
+            </a:prstGeom>
+            <a:noFill/>
+          </p:spPr>
+          <p:txBody>
+            <a:bodyPr wrap="none" rtlCol="0">
+              <a:spAutoFit/>
+            </a:bodyPr>
+            <a:lstStyle/>
+            <a:p>
+              <a:r>
+                <a:rPr lang="en-US" sz="2400" smtClean="0"/>
+                <a:t>Thành viên</a:t>
+              </a:r>
+              <a:endParaRPr lang="en-US" sz="2400"/>
+            </a:p>
+          </p:txBody>
+        </p:sp>
+      </p:grpSp>
+      <p:grpSp>
+        <p:nvGrpSpPr>
+          <p:cNvPr id="20" name="Group 19"/>
+          <p:cNvGrpSpPr/>
+          <p:nvPr/>
+        </p:nvGrpSpPr>
+        <p:grpSpPr>
+          <a:xfrm>
+            <a:off x="8865007" y="2867024"/>
+            <a:ext cx="2488793" cy="3129256"/>
+            <a:chOff x="9230424" y="2867024"/>
+            <a:chExt cx="2488793" cy="3129256"/>
+          </a:xfrm>
+        </p:grpSpPr>
+        <p:pic>
+          <p:nvPicPr>
+            <p:cNvPr id="14" name="Picture 13"/>
+            <p:cNvPicPr>
+              <a:picLocks noChangeAspect="1"/>
+            </p:cNvPicPr>
+            <p:nvPr/>
+          </p:nvPicPr>
+          <p:blipFill>
+            <a:blip r:embed="rId4">
+              <a:duotone>
+                <a:schemeClr val="accent1">
+                  <a:shade val="45000"/>
+                  <a:satMod val="135000"/>
+                </a:schemeClr>
+                <a:prstClr val="white"/>
+              </a:duotone>
+              <a:extLst>
+                <a:ext uri="{BEBA8EAE-BF5A-486C-A8C5-ECC9F3942E4B}">
+                  <a14:imgProps xmlns:a14="http://schemas.microsoft.com/office/drawing/2010/main">
+                    <a14:imgLayer r:embed="rId5"/>
+                  </a14:imgProps>
+                </a:ext>
+                <a:ext uri="{28A0092B-C50C-407E-A947-70E740481C1C}">
+                  <a14:useLocalDpi xmlns:a14="http://schemas.microsoft.com/office/drawing/2010/main" val="0"/>
+                </a:ext>
+              </a:extLst>
+            </a:blip>
+            <a:stretch>
+              <a:fillRect/>
+            </a:stretch>
+          </p:blipFill>
+          <p:spPr>
+            <a:xfrm>
+              <a:off x="9230424" y="2867024"/>
+              <a:ext cx="2488793" cy="2488793"/>
+            </a:xfrm>
+            <a:prstGeom prst="rect">
+              <a:avLst/>
+            </a:prstGeom>
+          </p:spPr>
+        </p:pic>
+        <p:sp>
+          <p:nvSpPr>
+            <p:cNvPr id="17" name="TextBox 16"/>
+            <p:cNvSpPr txBox="1"/>
+            <p:nvPr/>
+          </p:nvSpPr>
+          <p:spPr>
+            <a:xfrm>
+              <a:off x="9318093" y="5534615"/>
+              <a:ext cx="2313454" cy="461665"/>
+            </a:xfrm>
+            <a:prstGeom prst="rect">
+              <a:avLst/>
+            </a:prstGeom>
+            <a:noFill/>
+          </p:spPr>
+          <p:txBody>
+            <a:bodyPr wrap="none" rtlCol="0">
+              <a:spAutoFit/>
+            </a:bodyPr>
+            <a:lstStyle/>
+            <a:p>
+              <a:r>
+                <a:rPr lang="en-US" sz="2400" smtClean="0"/>
+                <a:t>Thành viên tự do</a:t>
+              </a:r>
+              <a:endParaRPr lang="en-US" sz="2400"/>
+            </a:p>
+          </p:txBody>
+        </p:sp>
+      </p:grpSp>
+    </p:spTree>
+    <p:extLst>
+      <p:ext uri="{BB962C8B-B14F-4D97-AF65-F5344CB8AC3E}">
+        <p14:creationId xmlns:p14="http://schemas.microsoft.com/office/powerpoint/2010/main" val="3050386573"/>
+      </p:ext>
+    </p:extLst>
+  </p:cSld>
+  <p:clrMapOvr>
+    <a:masterClrMapping/>
+  </p:clrMapOvr>
+  <p:timing>
+    <p:tnLst>
+      <p:par>
+        <p:cTn id="1" dur="indefinite" restart="never" nodeType="tmRoot"/>
+      </p:par>
+    </p:tnLst>
+  </p:timing>
+</p:sld>
+</file>
+
+<file path=ppt/slides/slide14.xml><?xml version="1.0" encoding="utf-8"?>
+<p:sld xmlns:a="http://schemas.openxmlformats.org/drawingml/2006/main" xmlns:r="http://schemas.openxmlformats.org/officeDocument/2006/relationships" xmlns:p="http://schemas.openxmlformats.org/presentationml/2006/main">
+  <p:cSld>
+    <p:spTree>
+      <p:nvGrpSpPr>
+        <p:cNvPr id="1" name=""/>
+        <p:cNvGrpSpPr/>
+        <p:nvPr/>
+      </p:nvGrpSpPr>
+      <p:grpSpPr>
+        <a:xfrm>
+          <a:off x="0" y="0"/>
+          <a:ext cx="0" cy="0"/>
+          <a:chOff x="0" y="0"/>
+          <a:chExt cx="0" cy="0"/>
+        </a:xfrm>
+      </p:grpSpPr>
+      <p:sp>
+        <p:nvSpPr>
+          <p:cNvPr id="7" name="Title 6"/>
+          <p:cNvSpPr>
+            <a:spLocks noGrp="1"/>
+          </p:cNvSpPr>
+          <p:nvPr>
+            <p:ph type="title"/>
+          </p:nvPr>
+        </p:nvSpPr>
+        <p:spPr/>
+        <p:txBody>
+          <a:bodyPr/>
+          <a:lstStyle/>
+          <a:p>
+            <a:r>
+              <a:rPr lang="en-US" smtClean="0"/>
               <a:t>Chức năng</a:t>
             </a:r>
             <a:endParaRPr lang="en-US"/>
@@ -10175,7 +12210,7 @@
             <p:ph idx="1"/>
             <p:extLst>
               <p:ext uri="{D42A27DB-BD31-4B8C-83A1-F6EECF244321}">
-                <p14:modId xmlns:p14="http://schemas.microsoft.com/office/powerpoint/2010/main" val="1765672332"/>
+                <p14:modId xmlns:p14="http://schemas.microsoft.com/office/powerpoint/2010/main" val="1279307099"/>
               </p:ext>
             </p:extLst>
           </p:nvPr>
@@ -10542,7 +12577,43 @@
                           <a:ea typeface="+mn-ea"/>
                           <a:cs typeface="+mn-cs"/>
                         </a:rPr>
-                        <a:t>Thống kê thành viên: tìm</a:t>
+                        <a:t>Quản</a:t>
+                      </a:r>
+                      <a:r>
+                        <a:rPr lang="en-US" sz="1800" kern="1200" baseline="0" smtClean="0">
+                          <a:solidFill>
+                            <a:schemeClr val="dk1"/>
+                          </a:solidFill>
+                          <a:effectLst/>
+                          <a:latin typeface="+mn-lt"/>
+                          <a:ea typeface="+mn-ea"/>
+                          <a:cs typeface="+mn-cs"/>
+                        </a:rPr>
+                        <a:t> lý</a:t>
+                      </a:r>
+                      <a:r>
+                        <a:rPr lang="en-US" sz="1800" kern="1200" smtClean="0">
+                          <a:solidFill>
+                            <a:schemeClr val="dk1"/>
+                          </a:solidFill>
+                          <a:effectLst/>
+                          <a:latin typeface="+mn-lt"/>
+                          <a:ea typeface="+mn-ea"/>
+                          <a:cs typeface="+mn-cs"/>
+                        </a:rPr>
+                        <a:t> </a:t>
+                      </a:r>
+                      <a:r>
+                        <a:rPr lang="en-US" sz="1800" kern="1200" smtClean="0">
+                          <a:solidFill>
+                            <a:schemeClr val="dk1"/>
+                          </a:solidFill>
+                          <a:effectLst/>
+                          <a:latin typeface="+mn-lt"/>
+                          <a:ea typeface="+mn-ea"/>
+                          <a:cs typeface="+mn-cs"/>
+                        </a:rPr>
+                        <a:t>thành viên: tìm</a:t>
                       </a:r>
                       <a:r>
                         <a:rPr lang="en-US" sz="1800" kern="1200" baseline="0" smtClean="0">
@@ -10626,6 +12697,85 @@
 </p:sld>
 </file>
 
+<file path=ppt/slides/slide15.xml><?xml version="1.0" encoding="utf-8"?>
+<p:sld xmlns:a="http://schemas.openxmlformats.org/drawingml/2006/main" xmlns:r="http://schemas.openxmlformats.org/officeDocument/2006/relationships" xmlns:p="http://schemas.openxmlformats.org/presentationml/2006/main">
+  <p:cSld>
+    <p:spTree>
+      <p:nvGrpSpPr>
+        <p:cNvPr id="1" name=""/>
+        <p:cNvGrpSpPr/>
+        <p:nvPr/>
+      </p:nvGrpSpPr>
+      <p:grpSpPr>
+        <a:xfrm>
+          <a:off x="0" y="0"/>
+          <a:ext cx="0" cy="0"/>
+          <a:chOff x="0" y="0"/>
+          <a:chExt cx="0" cy="0"/>
+        </a:xfrm>
+      </p:grpSpPr>
+      <p:sp>
+        <p:nvSpPr>
+          <p:cNvPr id="7" name="Title 6"/>
+          <p:cNvSpPr>
+            <a:spLocks noGrp="1"/>
+          </p:cNvSpPr>
+          <p:nvPr>
+            <p:ph type="title"/>
+          </p:nvPr>
+        </p:nvSpPr>
+        <p:spPr/>
+        <p:txBody>
+          <a:bodyPr/>
+          <a:lstStyle/>
+          <a:p>
+            <a:r>
+              <a:rPr lang="en-US" smtClean="0"/>
+              <a:t>Demo</a:t>
+            </a:r>
+            <a:endParaRPr lang="en-US"/>
+          </a:p>
+        </p:txBody>
+      </p:sp>
+      <p:sp>
+        <p:nvSpPr>
+          <p:cNvPr id="3" name="Text Placeholder 2"/>
+          <p:cNvSpPr>
+            <a:spLocks noGrp="1"/>
+          </p:cNvSpPr>
+          <p:nvPr>
+            <p:ph type="body" idx="1"/>
+          </p:nvPr>
+        </p:nvSpPr>
+        <p:spPr/>
+        <p:txBody>
+          <a:bodyPr/>
+          <a:lstStyle/>
+          <a:p>
+            <a:endParaRPr lang="en-US"/>
+          </a:p>
+        </p:txBody>
+      </p:sp>
+    </p:spTree>
+    <p:extLst>
+      <p:ext uri="{BB962C8B-B14F-4D97-AF65-F5344CB8AC3E}">
+        <p14:creationId xmlns:p14="http://schemas.microsoft.com/office/powerpoint/2010/main" val="562113000"/>
+      </p:ext>
+    </p:extLst>
+  </p:cSld>
+  <p:clrMapOvr>
+    <a:masterClrMapping/>
+  </p:clrMapOvr>
+  <p:timing>
+    <p:tnLst>
+      <p:par>
+        <p:cTn id="1" dur="indefinite" restart="never" nodeType="tmRoot"/>
+      </p:par>
+    </p:tnLst>
+  </p:timing>
+</p:sld>
+</file>
+
 <file path=ppt/slides/slide2.xml><?xml version="1.0" encoding="utf-8"?>
 <p:sld xmlns:a="http://schemas.openxmlformats.org/drawingml/2006/main" xmlns:r="http://schemas.openxmlformats.org/officeDocument/2006/relationships" xmlns:p="http://schemas.openxmlformats.org/presentationml/2006/main">
   <p:cSld>
@@ -11000,7 +13150,7 @@
         </p:xfrm>
         <a:graphic>
           <a:graphicData uri="http://schemas.openxmlformats.org/drawingml/2006/diagram">
-            <dgm:relIds xmlns:dgm="http://schemas.openxmlformats.org/drawingml/2006/diagram" xmlns:r="http://schemas.openxmlformats.org/officeDocument/2006/relationships" r:dm="rId2" r:lo="rId3" r:qs="rId4" r:cs="rId5"/>
+            <dgm:relIds xmlns:dgm="http://schemas.openxmlformats.org/drawingml/2006/diagram" xmlns:r="http://schemas.openxmlformats.org/officeDocument/2006/relationships" r:dm="rId3" r:lo="rId4" r:qs="rId5" r:cs="rId6"/>
           </a:graphicData>
         </a:graphic>
       </p:graphicFrame>
@@ -11098,7 +13248,7 @@
           </p:nvPr>
         </p:nvPicPr>
         <p:blipFill>
-          <a:blip r:embed="rId2">
+          <a:blip r:embed="rId3">
             <a:extLst>
               <a:ext uri="{28A0092B-C50C-407E-A947-70E740481C1C}">
                 <a14:useLocalDpi xmlns:a14="http://schemas.microsoft.com/office/drawing/2010/main" val="0"/>
@@ -11155,7 +13305,7 @@
           <p:nvPr/>
         </p:nvPicPr>
         <p:blipFill>
-          <a:blip r:embed="rId3">
+          <a:blip r:embed="rId4">
             <a:extLst>
               <a:ext uri="{28A0092B-C50C-407E-A947-70E740481C1C}">
                 <a14:useLocalDpi xmlns:a14="http://schemas.microsoft.com/office/drawing/2010/main" val="0"/>
@@ -11185,7 +13335,7 @@
           <p:nvPr/>
         </p:nvPicPr>
         <p:blipFill>
-          <a:blip r:embed="rId4">
+          <a:blip r:embed="rId5">
             <a:extLst>
               <a:ext uri="{28A0092B-C50C-407E-A947-70E740481C1C}">
                 <a14:useLocalDpi xmlns:a14="http://schemas.microsoft.com/office/drawing/2010/main" val="0"/>
@@ -11313,11 +13463,39 @@
         </p:blipFill>
         <p:spPr>
           <a:xfrm>
-            <a:off x="3334544" y="3251994"/>
+            <a:off x="3334544" y="2725738"/>
             <a:ext cx="5524500" cy="2190750"/>
           </a:xfrm>
         </p:spPr>
       </p:pic>
+      <p:sp>
+        <p:nvSpPr>
+          <p:cNvPr id="4" name="Rectangle 3"/>
+          <p:cNvSpPr/>
+          <p:nvPr/>
+        </p:nvSpPr>
+        <p:spPr>
+          <a:xfrm>
+            <a:off x="3939472" y="5137151"/>
+            <a:ext cx="4314643" cy="400110"/>
+          </a:xfrm>
+          <a:prstGeom prst="rect">
+            <a:avLst/>
+          </a:prstGeom>
+        </p:spPr>
+        <p:txBody>
+          <a:bodyPr wrap="none">
+            <a:spAutoFit/>
+          </a:bodyPr>
+          <a:lstStyle/>
+          <a:p>
+            <a:r>
+              <a:rPr lang="en-US" sz="2000"/>
+              <a:t>https://github.com/duduct/NienLuan4/</a:t>
+            </a:r>
+          </a:p>
+        </p:txBody>
+      </p:sp>
     </p:spTree>
     <p:extLst>
       <p:ext uri="{BB962C8B-B14F-4D97-AF65-F5344CB8AC3E}">
@@ -11395,7 +13573,7 @@
         </p:nvGraphicFramePr>
         <p:xfrm>
           <a:off x="974785" y="1681665"/>
-          <a:ext cx="9808234" cy="3862385"/>
+          <a:ext cx="9808234" cy="3921565"/>
         </p:xfrm>
         <a:graphic>
           <a:graphicData uri="http://schemas.openxmlformats.org/drawingml/2006/table">
@@ -11626,13 +13804,7 @@
                         <a:rPr lang="en-US" sz="1800">
                           <a:effectLst/>
                         </a:rPr>
-                        <a:t>kế hoạch </a:t>
-                      </a:r>
-                      <a:r>
-                        <a:rPr lang="en-US" sz="1800">
-                          <a:effectLst/>
-                        </a:rPr>
-                        <a:t>thực </a:t>
+                        <a:t>kế hoạch thực </a:t>
                       </a:r>
                       <a:r>
                         <a:rPr lang="en-US" sz="1800" smtClean="0">
@@ -11783,13 +13955,7 @@
                         <a:rPr lang="en-US" sz="1800">
                           <a:effectLst/>
                         </a:rPr>
-                        <a:t>high </a:t>
-                      </a:r>
-                      <a:r>
-                        <a:rPr lang="en-US" sz="1800">
-                          <a:effectLst/>
-                        </a:rPr>
-                        <a:t>level </a:t>
+                        <a:t>high level </a:t>
                       </a:r>
                       <a:r>
                         <a:rPr lang="en-US" sz="1800" smtClean="0">
@@ -12162,13 +14328,7 @@
                         <a:rPr lang="en-US" sz="1800">
                           <a:effectLst/>
                         </a:rPr>
-                        <a:t>tài liệu </a:t>
-                      </a:r>
-                      <a:r>
-                        <a:rPr lang="en-US" sz="1800">
-                          <a:effectLst/>
-                        </a:rPr>
-                        <a:t>kiểm </a:t>
+                        <a:t>tài liệu kiểm </a:t>
                       </a:r>
                       <a:r>
                         <a:rPr lang="en-US" sz="1800" smtClean="0">
@@ -12784,4 +14944,265 @@
     </a:ext>
   </a:extLst>
 </a:theme>
+</file>
+
+<file path=ppt/theme/theme2.xml><?xml version="1.0" encoding="utf-8"?>
+<a:theme xmlns:a="http://schemas.openxmlformats.org/drawingml/2006/main" name="Office Theme">
+  <a:themeElements>
+    <a:clrScheme name="Office">
+      <a:dk1>
+        <a:sysClr val="windowText" lastClr="000000"/>
+      </a:dk1>
+      <a:lt1>
+        <a:sysClr val="window" lastClr="FFFFFF"/>
+      </a:lt1>
+      <a:dk2>
+        <a:srgbClr val="44546A"/>
+      </a:dk2>
+      <a:lt2>
+        <a:srgbClr val="E7E6E6"/>
+      </a:lt2>
+      <a:accent1>
+        <a:srgbClr val="5B9BD5"/>
+      </a:accent1>
+      <a:accent2>
+        <a:srgbClr val="ED7D31"/>
+      </a:accent2>
+      <a:accent3>
+        <a:srgbClr val="A5A5A5"/>
+      </a:accent3>
+      <a:accent4>
+        <a:srgbClr val="FFC000"/>
+      </a:accent4>
+      <a:accent5>
+        <a:srgbClr val="4472C4"/>
+      </a:accent5>
+      <a:accent6>
+        <a:srgbClr val="70AD47"/>
+      </a:accent6>
+      <a:hlink>
+        <a:srgbClr val="0563C1"/>
+      </a:hlink>
+      <a:folHlink>
+        <a:srgbClr val="954F72"/>
+      </a:folHlink>
+    </a:clrScheme>
+    <a:fontScheme name="Office">
+      <a:majorFont>
+        <a:latin typeface="Calibri Light" panose="020F0302020204030204"/>
+        <a:ea typeface=""/>
+        <a:cs typeface=""/>
+        <a:font script="Jpan" typeface="ＭＳ Ｐゴシック"/>
+        <a:font script="Hang" typeface="맑은 고딕"/>
+        <a:font script="Hans" typeface="宋体"/>
+        <a:font script="Hant" typeface="新細明體"/>
+        <a:font script="Arab" typeface="Times New Roman"/>
+        <a:font script="Hebr" typeface="Times New Roman"/>
+        <a:font script="Thai" typeface="Angsana New"/>
+        <a:font script="Ethi" typeface="Nyala"/>
+        <a:font script="Beng" typeface="Vrinda"/>
+        <a:font script="Gujr" typeface="Shruti"/>
+        <a:font script="Khmr" typeface="MoolBoran"/>
+        <a:font script="Knda" typeface="Tunga"/>
+        <a:font script="Guru" typeface="Raavi"/>
+        <a:font script="Cans" typeface="Euphemia"/>
+        <a:font script="Cher" typeface="Plantagenet Cherokee"/>
+        <a:font script="Yiii" typeface="Microsoft Yi Baiti"/>
+        <a:font script="Tibt" typeface="Microsoft Himalaya"/>
+        <a:font script="Thaa" typeface="MV Boli"/>
+        <a:font script="Deva" typeface="Mangal"/>
+        <a:font script="Telu" typeface="Gautami"/>
+        <a:font script="Taml" typeface="Latha"/>
+        <a:font script="Syrc" typeface="Estrangelo Edessa"/>
+        <a:font script="Orya" typeface="Kalinga"/>
+        <a:font script="Mlym" typeface="Kartika"/>
+        <a:font script="Laoo" typeface="DokChampa"/>
+        <a:font script="Sinh" typeface="Iskoola Pota"/>
+        <a:font script="Mong" typeface="Mongolian Baiti"/>
+        <a:font script="Viet" typeface="Times New Roman"/>
+        <a:font script="Uigh" typeface="Microsoft Uighur"/>
+        <a:font script="Geor" typeface="Sylfaen"/>
+      </a:majorFont>
+      <a:minorFont>
+        <a:latin typeface="Calibri" panose="020F0502020204030204"/>
+        <a:ea typeface=""/>
+        <a:cs typeface=""/>
+        <a:font script="Jpan" typeface="ＭＳ Ｐゴシック"/>
+        <a:font script="Hang" typeface="맑은 고딕"/>
+        <a:font script="Hans" typeface="宋体"/>
+        <a:font script="Hant" typeface="新細明體"/>
+        <a:font script="Arab" typeface="Arial"/>
+        <a:font script="Hebr" typeface="Arial"/>
+        <a:font script="Thai" typeface="Cordia New"/>
+        <a:font script="Ethi" typeface="Nyala"/>
+        <a:font script="Beng" typeface="Vrinda"/>
+        <a:font script="Gujr" typeface="Shruti"/>
+        <a:font script="Khmr" typeface="DaunPenh"/>
+        <a:font script="Knda" typeface="Tunga"/>
+        <a:font script="Guru" typeface="Raavi"/>
+        <a:font script="Cans" typeface="Euphemia"/>
+        <a:font script="Cher" typeface="Plantagenet Cherokee"/>
+        <a:font script="Yiii" typeface="Microsoft Yi Baiti"/>
+        <a:font script="Tibt" typeface="Microsoft Himalaya"/>
+        <a:font script="Thaa" typeface="MV Boli"/>
+        <a:font script="Deva" typeface="Mangal"/>
+        <a:font script="Telu" typeface="Gautami"/>
+        <a:font script="Taml" typeface="Latha"/>
+        <a:font script="Syrc" typeface="Estrangelo Edessa"/>
+        <a:font script="Orya" typeface="Kalinga"/>
+        <a:font script="Mlym" typeface="Kartika"/>
+        <a:font script="Laoo" typeface="DokChampa"/>
+        <a:font script="Sinh" typeface="Iskoola Pota"/>
+        <a:font script="Mong" typeface="Mongolian Baiti"/>
+        <a:font script="Viet" typeface="Arial"/>
+        <a:font script="Uigh" typeface="Microsoft Uighur"/>
+        <a:font script="Geor" typeface="Sylfaen"/>
+      </a:minorFont>
+    </a:fontScheme>
+    <a:fmtScheme name="Office">
+      <a:fillStyleLst>
+        <a:solidFill>
+          <a:schemeClr val="phClr"/>
+        </a:solidFill>
+        <a:gradFill rotWithShape="1">
+          <a:gsLst>
+            <a:gs pos="0">
+              <a:schemeClr val="phClr">
+                <a:lumMod val="110000"/>
+                <a:satMod val="105000"/>
+                <a:tint val="67000"/>
+              </a:schemeClr>
+            </a:gs>
+            <a:gs pos="50000">
+              <a:schemeClr val="phClr">
+                <a:lumMod val="105000"/>
+                <a:satMod val="103000"/>
+                <a:tint val="73000"/>
+              </a:schemeClr>
+            </a:gs>
+            <a:gs pos="100000">
+              <a:schemeClr val="phClr">
+                <a:lumMod val="105000"/>
+                <a:satMod val="109000"/>
+                <a:tint val="81000"/>
+              </a:schemeClr>
+            </a:gs>
+          </a:gsLst>
+          <a:lin ang="5400000" scaled="0"/>
+        </a:gradFill>
+        <a:gradFill rotWithShape="1">
+          <a:gsLst>
+            <a:gs pos="0">
+              <a:schemeClr val="phClr">
+                <a:satMod val="103000"/>
+                <a:lumMod val="102000"/>
+                <a:tint val="94000"/>
+              </a:schemeClr>
+            </a:gs>
+            <a:gs pos="50000">
+              <a:schemeClr val="phClr">
+                <a:satMod val="110000"/>
+                <a:lumMod val="100000"/>
+                <a:shade val="100000"/>
+              </a:schemeClr>
+            </a:gs>
+            <a:gs pos="100000">
+              <a:schemeClr val="phClr">
+                <a:lumMod val="99000"/>
+                <a:satMod val="120000"/>
+                <a:shade val="78000"/>
+              </a:schemeClr>
+            </a:gs>
+          </a:gsLst>
+          <a:lin ang="5400000" scaled="0"/>
+        </a:gradFill>
+      </a:fillStyleLst>
+      <a:lnStyleLst>
+        <a:ln w="6350" cap="flat" cmpd="sng" algn="ctr">
+          <a:solidFill>
+            <a:schemeClr val="phClr"/>
+          </a:solidFill>
+          <a:prstDash val="solid"/>
+          <a:miter lim="800000"/>
+        </a:ln>
+        <a:ln w="12700" cap="flat" cmpd="sng" algn="ctr">
+          <a:solidFill>
+            <a:schemeClr val="phClr"/>
+          </a:solidFill>
+          <a:prstDash val="solid"/>
+          <a:miter lim="800000"/>
+        </a:ln>
+        <a:ln w="19050" cap="flat" cmpd="sng" algn="ctr">
+          <a:solidFill>
+            <a:schemeClr val="phClr"/>
+          </a:solidFill>
+          <a:prstDash val="solid"/>
+          <a:miter lim="800000"/>
+        </a:ln>
+      </a:lnStyleLst>
+      <a:effectStyleLst>
+        <a:effectStyle>
+          <a:effectLst/>
+        </a:effectStyle>
+        <a:effectStyle>
+          <a:effectLst/>
+        </a:effectStyle>
+        <a:effectStyle>
+          <a:effectLst>
+            <a:outerShdw blurRad="57150" dist="19050" dir="5400000" algn="ctr" rotWithShape="0">
+              <a:srgbClr val="000000">
+                <a:alpha val="63000"/>
+              </a:srgbClr>
+            </a:outerShdw>
+          </a:effectLst>
+        </a:effectStyle>
+      </a:effectStyleLst>
+      <a:bgFillStyleLst>
+        <a:solidFill>
+          <a:schemeClr val="phClr"/>
+        </a:solidFill>
+        <a:solidFill>
+          <a:schemeClr val="phClr">
+            <a:tint val="95000"/>
+            <a:satMod val="170000"/>
+          </a:schemeClr>
+        </a:solidFill>
+        <a:gradFill rotWithShape="1">
+          <a:gsLst>
+            <a:gs pos="0">
+              <a:schemeClr val="phClr">
+                <a:tint val="93000"/>
+                <a:satMod val="150000"/>
+                <a:shade val="98000"/>
+                <a:lumMod val="102000"/>
+              </a:schemeClr>
+            </a:gs>
+            <a:gs pos="50000">
+              <a:schemeClr val="phClr">
+                <a:tint val="98000"/>
+                <a:satMod val="130000"/>
+                <a:shade val="90000"/>
+                <a:lumMod val="103000"/>
+              </a:schemeClr>
+            </a:gs>
+            <a:gs pos="100000">
+              <a:schemeClr val="phClr">
+                <a:shade val="63000"/>
+                <a:satMod val="120000"/>
+              </a:schemeClr>
+            </a:gs>
+          </a:gsLst>
+          <a:lin ang="5400000" scaled="0"/>
+        </a:gradFill>
+      </a:bgFillStyleLst>
+    </a:fmtScheme>
+  </a:themeElements>
+  <a:objectDefaults/>
+  <a:extraClrSchemeLst/>
+  <a:extLst>
+    <a:ext uri="{05A4C25C-085E-4340-85A3-A5531E510DB2}">
+      <thm15:themeFamily xmlns:thm15="http://schemas.microsoft.com/office/thememl/2012/main" name="Office Theme" id="{62F939B6-93AF-4DB8-9C6B-D6C7DFDC589F}" vid="{4A3C46E8-61CC-4603-A589-7422A47A8E4A}"/>
+    </a:ext>
+  </a:extLst>
+</a:theme>
 </file>
</xml_diff>

<commit_message>
Cập nhật slide báo cáo, Mô hình trong file design
</commit_message>
<xml_diff>
--- a/docs/NL04_Báo cáo niên luận.pptx
+++ b/docs/NL04_Báo cáo niên luận.pptx
@@ -5,7 +5,7 @@
     <p:sldMasterId id="2147483648" r:id="rId1"/>
   </p:sldMasterIdLst>
   <p:notesMasterIdLst>
-    <p:notesMasterId r:id="rId17"/>
+    <p:notesMasterId r:id="rId20"/>
   </p:notesMasterIdLst>
   <p:sldIdLst>
     <p:sldId id="256" r:id="rId2"/>
@@ -23,6 +23,9 @@
     <p:sldId id="271" r:id="rId14"/>
     <p:sldId id="268" r:id="rId15"/>
     <p:sldId id="269" r:id="rId16"/>
+    <p:sldId id="273" r:id="rId17"/>
+    <p:sldId id="274" r:id="rId18"/>
+    <p:sldId id="275" r:id="rId19"/>
   </p:sldIdLst>
   <p:sldSz cx="12192000" cy="6858000"/>
   <p:notesSz cx="6858000" cy="9144000"/>
@@ -124,6 +127,9 @@
   <p:extLst>
     <p:ext uri="{EFAFB233-063F-42B5-8137-9DF3F51BA10A}">
       <p15:sldGuideLst xmlns:p15="http://schemas.microsoft.com/office/powerpoint/2012/main"/>
+    </p:ext>
+    <p:ext uri="{2D200454-40CA-4A62-9FC3-DE9A4176ACB9}">
+      <p15:notesGuideLst xmlns:p15="http://schemas.microsoft.com/office/powerpoint/2012/main"/>
     </p:ext>
   </p:extLst>
 </p:presentation>
@@ -4754,6 +4760,168 @@
           <a:bodyPr/>
           <a:lstStyle/>
           <a:p>
+            <a:r>
+              <a:rPr lang="en-US" sz="1200" b="1" kern="1200" smtClean="0">
+                <a:solidFill>
+                  <a:schemeClr val="tx1"/>
+                </a:solidFill>
+                <a:effectLst/>
+                <a:latin typeface="+mn-lt"/>
+                <a:ea typeface="+mn-ea"/>
+                <a:cs typeface="+mn-cs"/>
+              </a:rPr>
+              <a:t>Dùng</a:t>
+            </a:r>
+            <a:r>
+              <a:rPr lang="en-US" sz="1200" b="1" kern="1200" baseline="0" smtClean="0">
+                <a:solidFill>
+                  <a:schemeClr val="tx1"/>
+                </a:solidFill>
+                <a:effectLst/>
+                <a:latin typeface="+mn-lt"/>
+                <a:ea typeface="+mn-ea"/>
+                <a:cs typeface="+mn-cs"/>
+              </a:rPr>
+              <a:t> service layer pattern và Dao layer pattern</a:t>
+            </a:r>
+            <a:endParaRPr lang="en-US" sz="1200" b="1" kern="1200" smtClean="0">
+              <a:solidFill>
+                <a:schemeClr val="tx1"/>
+              </a:solidFill>
+              <a:effectLst/>
+              <a:latin typeface="+mn-lt"/>
+              <a:ea typeface="+mn-ea"/>
+              <a:cs typeface="+mn-cs"/>
+            </a:endParaRPr>
+          </a:p>
+          <a:p>
+            <a:r>
+              <a:rPr lang="en-US" sz="1200" b="1" kern="1200" smtClean="0">
+                <a:solidFill>
+                  <a:schemeClr val="tx1"/>
+                </a:solidFill>
+                <a:effectLst/>
+                <a:latin typeface="+mn-lt"/>
+                <a:ea typeface="+mn-ea"/>
+                <a:cs typeface="+mn-cs"/>
+              </a:rPr>
+              <a:t>View</a:t>
+            </a:r>
+            <a:r>
+              <a:rPr lang="en-US" sz="1200" kern="1200" smtClean="0">
+                <a:solidFill>
+                  <a:schemeClr val="tx1"/>
+                </a:solidFill>
+                <a:effectLst/>
+                <a:latin typeface="+mn-lt"/>
+                <a:ea typeface="+mn-ea"/>
+                <a:cs typeface="+mn-cs"/>
+              </a:rPr>
+              <a:t>:  tầng tương tác với người sử dụng, người sử dụng sẽ gửi các các yêu cầu về mặt tài nguyên , hoặc gửi các thông tin lên view. View sẽ gửi thông tin từ người dùng đến Controller.</a:t>
+            </a:r>
+          </a:p>
+          <a:p>
+            <a:r>
+              <a:rPr lang="en-US" sz="1200" b="1" kern="1200" smtClean="0">
+                <a:solidFill>
+                  <a:schemeClr val="tx1"/>
+                </a:solidFill>
+                <a:effectLst/>
+                <a:latin typeface="+mn-lt"/>
+                <a:ea typeface="+mn-ea"/>
+                <a:cs typeface="+mn-cs"/>
+              </a:rPr>
+              <a:t>Controller</a:t>
+            </a:r>
+            <a:r>
+              <a:rPr lang="en-US" sz="1200" kern="1200" smtClean="0">
+                <a:solidFill>
+                  <a:schemeClr val="tx1"/>
+                </a:solidFill>
+                <a:effectLst/>
+                <a:latin typeface="+mn-lt"/>
+                <a:ea typeface="+mn-ea"/>
+                <a:cs typeface="+mn-cs"/>
+              </a:rPr>
+              <a:t>: tầng này sẽ nhận thông  tin từ view và sẽ quyết định xem sẽ xử lý thông tin đó như thế nào và gọi dao hay service nào để xử lý công việc.</a:t>
+            </a:r>
+          </a:p>
+          <a:p>
+            <a:r>
+              <a:rPr lang="en-US" sz="1200" b="1" kern="1200" smtClean="0">
+                <a:solidFill>
+                  <a:schemeClr val="tx1"/>
+                </a:solidFill>
+                <a:effectLst/>
+                <a:latin typeface="+mn-lt"/>
+                <a:ea typeface="+mn-ea"/>
+                <a:cs typeface="+mn-cs"/>
+              </a:rPr>
+              <a:t>Service, DAO</a:t>
+            </a:r>
+            <a:r>
+              <a:rPr lang="en-US" sz="1200" kern="1200" smtClean="0">
+                <a:solidFill>
+                  <a:schemeClr val="tx1"/>
+                </a:solidFill>
+                <a:effectLst/>
+                <a:latin typeface="+mn-lt"/>
+                <a:ea typeface="+mn-ea"/>
+                <a:cs typeface="+mn-cs"/>
+              </a:rPr>
+              <a:t>: tầng này nhận thông tin từ Controller và sẽ tương tác xử lý dữ liệu trên model. Tầng này chứa các lệnh, dịch vụ liên quan đến việc thao tác csdl như thêm, sửa, xóa,… và các lệnh tương ứng riêng biệt cho từng model.</a:t>
+            </a:r>
+          </a:p>
+          <a:p>
+            <a:r>
+              <a:rPr lang="en-US" sz="1200" b="1" kern="1200" smtClean="0">
+                <a:solidFill>
+                  <a:schemeClr val="tx1"/>
+                </a:solidFill>
+                <a:effectLst/>
+                <a:latin typeface="+mn-lt"/>
+                <a:ea typeface="+mn-ea"/>
+                <a:cs typeface="+mn-cs"/>
+              </a:rPr>
+              <a:t>Model</a:t>
+            </a:r>
+            <a:r>
+              <a:rPr lang="en-US" sz="1200" kern="1200" smtClean="0">
+                <a:solidFill>
+                  <a:schemeClr val="tx1"/>
+                </a:solidFill>
+                <a:effectLst/>
+                <a:latin typeface="+mn-lt"/>
+                <a:ea typeface="+mn-ea"/>
+                <a:cs typeface="+mn-cs"/>
+              </a:rPr>
+              <a:t>: tầng này sẽ tương tác với cơ sở dữ liệu, là hình ảnh hướng đối tượng của cơ sở dữ liệu. Mỗi bảng trong csdl sẽ tương ứng với một đối tượng trong tầng Model. Mọi thay đổi trên Model sẽ thay đổi trên csdl.</a:t>
+            </a:r>
+          </a:p>
+          <a:p>
+            <a:r>
+              <a:rPr lang="en-US" sz="1200" kern="1200" smtClean="0">
+                <a:solidFill>
+                  <a:schemeClr val="tx1"/>
+                </a:solidFill>
+                <a:effectLst/>
+                <a:latin typeface="+mn-lt"/>
+                <a:ea typeface="+mn-ea"/>
+                <a:cs typeface="+mn-cs"/>
+              </a:rPr>
+              <a:t/>
+            </a:r>
+            <a:br>
+              <a:rPr lang="en-US" sz="1200" kern="1200" smtClean="0">
+                <a:solidFill>
+                  <a:schemeClr val="tx1"/>
+                </a:solidFill>
+                <a:effectLst/>
+                <a:latin typeface="+mn-lt"/>
+                <a:ea typeface="+mn-ea"/>
+                <a:cs typeface="+mn-cs"/>
+              </a:rPr>
+            </a:br>
             <a:endParaRPr lang="en-US"/>
           </a:p>
         </p:txBody>
@@ -5859,6 +6027,403 @@
 </file>
 
 <file path=ppt/slideLayouts/slideLayout11.xml><?xml version="1.0" encoding="utf-8"?>
+<p:sldLayout xmlns:a="http://schemas.openxmlformats.org/drawingml/2006/main" xmlns:r="http://schemas.openxmlformats.org/officeDocument/2006/relationships" xmlns:p="http://schemas.openxmlformats.org/presentationml/2006/main" type="secHead" preserve="1">
+  <p:cSld name="3_Section Header">
+    <p:spTree>
+      <p:nvGrpSpPr>
+        <p:cNvPr id="1" name=""/>
+        <p:cNvGrpSpPr/>
+        <p:nvPr/>
+      </p:nvGrpSpPr>
+      <p:grpSpPr>
+        <a:xfrm>
+          <a:off x="0" y="0"/>
+          <a:ext cx="0" cy="0"/>
+          <a:chOff x="0" y="0"/>
+          <a:chExt cx="0" cy="0"/>
+        </a:xfrm>
+      </p:grpSpPr>
+      <p:sp>
+        <p:nvSpPr>
+          <p:cNvPr id="2" name="Title 1"/>
+          <p:cNvSpPr>
+            <a:spLocks noGrp="1"/>
+          </p:cNvSpPr>
+          <p:nvPr>
+            <p:ph type="title"/>
+          </p:nvPr>
+        </p:nvSpPr>
+        <p:spPr>
+          <a:xfrm>
+            <a:off x="831850" y="1709738"/>
+            <a:ext cx="10515600" cy="2852737"/>
+          </a:xfrm>
+        </p:spPr>
+        <p:txBody>
+          <a:bodyPr anchor="b"/>
+          <a:lstStyle>
+            <a:lvl1pPr>
+              <a:defRPr sz="6000"/>
+            </a:lvl1pPr>
+          </a:lstStyle>
+          <a:p>
+            <a:r>
+              <a:rPr lang="en-US" smtClean="0"/>
+              <a:t>Click to edit Master title style</a:t>
+            </a:r>
+            <a:endParaRPr lang="en-US"/>
+          </a:p>
+        </p:txBody>
+      </p:sp>
+      <p:sp>
+        <p:nvSpPr>
+          <p:cNvPr id="3" name="Text Placeholder 2"/>
+          <p:cNvSpPr>
+            <a:spLocks noGrp="1"/>
+          </p:cNvSpPr>
+          <p:nvPr>
+            <p:ph type="body" idx="1"/>
+          </p:nvPr>
+        </p:nvSpPr>
+        <p:spPr>
+          <a:xfrm>
+            <a:off x="831850" y="4589463"/>
+            <a:ext cx="10515600" cy="1500187"/>
+          </a:xfrm>
+        </p:spPr>
+        <p:txBody>
+          <a:bodyPr/>
+          <a:lstStyle>
+            <a:lvl1pPr marL="0" indent="0">
+              <a:buNone/>
+              <a:defRPr sz="2400">
+                <a:solidFill>
+                  <a:schemeClr val="tx1">
+                    <a:tint val="75000"/>
+                  </a:schemeClr>
+                </a:solidFill>
+              </a:defRPr>
+            </a:lvl1pPr>
+            <a:lvl2pPr marL="457200" indent="0">
+              <a:buNone/>
+              <a:defRPr sz="2000">
+                <a:solidFill>
+                  <a:schemeClr val="tx1">
+                    <a:tint val="75000"/>
+                  </a:schemeClr>
+                </a:solidFill>
+              </a:defRPr>
+            </a:lvl2pPr>
+            <a:lvl3pPr marL="914400" indent="0">
+              <a:buNone/>
+              <a:defRPr sz="1800">
+                <a:solidFill>
+                  <a:schemeClr val="tx1">
+                    <a:tint val="75000"/>
+                  </a:schemeClr>
+                </a:solidFill>
+              </a:defRPr>
+            </a:lvl3pPr>
+            <a:lvl4pPr marL="1371600" indent="0">
+              <a:buNone/>
+              <a:defRPr sz="1600">
+                <a:solidFill>
+                  <a:schemeClr val="tx1">
+                    <a:tint val="75000"/>
+                  </a:schemeClr>
+                </a:solidFill>
+              </a:defRPr>
+            </a:lvl4pPr>
+            <a:lvl5pPr marL="1828800" indent="0">
+              <a:buNone/>
+              <a:defRPr sz="1600">
+                <a:solidFill>
+                  <a:schemeClr val="tx1">
+                    <a:tint val="75000"/>
+                  </a:schemeClr>
+                </a:solidFill>
+              </a:defRPr>
+            </a:lvl5pPr>
+            <a:lvl6pPr marL="2286000" indent="0">
+              <a:buNone/>
+              <a:defRPr sz="1600">
+                <a:solidFill>
+                  <a:schemeClr val="tx1">
+                    <a:tint val="75000"/>
+                  </a:schemeClr>
+                </a:solidFill>
+              </a:defRPr>
+            </a:lvl6pPr>
+            <a:lvl7pPr marL="2743200" indent="0">
+              <a:buNone/>
+              <a:defRPr sz="1600">
+                <a:solidFill>
+                  <a:schemeClr val="tx1">
+                    <a:tint val="75000"/>
+                  </a:schemeClr>
+                </a:solidFill>
+              </a:defRPr>
+            </a:lvl7pPr>
+            <a:lvl8pPr marL="3200400" indent="0">
+              <a:buNone/>
+              <a:defRPr sz="1600">
+                <a:solidFill>
+                  <a:schemeClr val="tx1">
+                    <a:tint val="75000"/>
+                  </a:schemeClr>
+                </a:solidFill>
+              </a:defRPr>
+            </a:lvl8pPr>
+            <a:lvl9pPr marL="3657600" indent="0">
+              <a:buNone/>
+              <a:defRPr sz="1600">
+                <a:solidFill>
+                  <a:schemeClr val="tx1">
+                    <a:tint val="75000"/>
+                  </a:schemeClr>
+                </a:solidFill>
+              </a:defRPr>
+            </a:lvl9pPr>
+          </a:lstStyle>
+          <a:p>
+            <a:pPr lvl="0"/>
+            <a:r>
+              <a:rPr lang="en-US" smtClean="0"/>
+              <a:t>Click to edit Master text styles</a:t>
+            </a:r>
+          </a:p>
+        </p:txBody>
+      </p:sp>
+      <p:sp>
+        <p:nvSpPr>
+          <p:cNvPr id="4" name="Date Placeholder 3"/>
+          <p:cNvSpPr>
+            <a:spLocks noGrp="1"/>
+          </p:cNvSpPr>
+          <p:nvPr>
+            <p:ph type="dt" sz="half" idx="10"/>
+          </p:nvPr>
+        </p:nvSpPr>
+        <p:spPr/>
+        <p:txBody>
+          <a:bodyPr/>
+          <a:lstStyle/>
+          <a:p>
+            <a:fld id="{1B1C7B4F-64A3-4178-AB39-192FCD8CC57C}" type="datetimeFigureOut">
+              <a:rPr lang="en-US" smtClean="0"/>
+              <a:t>11/10/2014</a:t>
+            </a:fld>
+            <a:endParaRPr lang="en-US"/>
+          </a:p>
+        </p:txBody>
+      </p:sp>
+      <p:sp>
+        <p:nvSpPr>
+          <p:cNvPr id="5" name="Footer Placeholder 4"/>
+          <p:cNvSpPr>
+            <a:spLocks noGrp="1"/>
+          </p:cNvSpPr>
+          <p:nvPr>
+            <p:ph type="ftr" sz="quarter" idx="11"/>
+          </p:nvPr>
+        </p:nvSpPr>
+        <p:spPr/>
+        <p:txBody>
+          <a:bodyPr/>
+          <a:lstStyle/>
+          <a:p>
+            <a:endParaRPr lang="en-US"/>
+          </a:p>
+        </p:txBody>
+      </p:sp>
+      <p:sp>
+        <p:nvSpPr>
+          <p:cNvPr id="6" name="Slide Number Placeholder 5"/>
+          <p:cNvSpPr>
+            <a:spLocks noGrp="1"/>
+          </p:cNvSpPr>
+          <p:nvPr>
+            <p:ph type="sldNum" sz="quarter" idx="12"/>
+          </p:nvPr>
+        </p:nvSpPr>
+        <p:spPr/>
+        <p:txBody>
+          <a:bodyPr/>
+          <a:lstStyle/>
+          <a:p>
+            <a:fld id="{D61EF543-C4B8-484C-A092-64252A3C78EE}" type="slidenum">
+              <a:rPr lang="en-US" smtClean="0"/>
+              <a:t>‹#›</a:t>
+            </a:fld>
+            <a:endParaRPr lang="en-US"/>
+          </a:p>
+        </p:txBody>
+      </p:sp>
+      <p:sp>
+        <p:nvSpPr>
+          <p:cNvPr id="8" name="Right Triangle 7"/>
+          <p:cNvSpPr/>
+          <p:nvPr/>
+        </p:nvSpPr>
+        <p:spPr>
+          <a:xfrm flipV="1">
+            <a:off x="0" y="0"/>
+            <a:ext cx="13115925" cy="1647825"/>
+          </a:xfrm>
+          <a:prstGeom prst="rtTriangle">
+            <a:avLst/>
+          </a:prstGeom>
+          <a:solidFill>
+            <a:srgbClr val="00B0F0">
+              <a:alpha val="16863"/>
+            </a:srgbClr>
+          </a:solidFill>
+          <a:ln>
+            <a:noFill/>
+          </a:ln>
+        </p:spPr>
+        <p:style>
+          <a:lnRef idx="2">
+            <a:schemeClr val="accent1">
+              <a:shade val="50000"/>
+            </a:schemeClr>
+          </a:lnRef>
+          <a:fillRef idx="1">
+            <a:schemeClr val="accent1"/>
+          </a:fillRef>
+          <a:effectRef idx="0">
+            <a:schemeClr val="accent1"/>
+          </a:effectRef>
+          <a:fontRef idx="minor">
+            <a:schemeClr val="lt1"/>
+          </a:fontRef>
+        </p:style>
+        <p:txBody>
+          <a:bodyPr rtlCol="0" anchor="ctr"/>
+          <a:lstStyle/>
+          <a:p>
+            <a:pPr algn="ctr"/>
+            <a:endParaRPr lang="en-US"/>
+          </a:p>
+        </p:txBody>
+      </p:sp>
+      <p:sp>
+        <p:nvSpPr>
+          <p:cNvPr id="9" name="Right Triangle 8"/>
+          <p:cNvSpPr/>
+          <p:nvPr/>
+        </p:nvSpPr>
+        <p:spPr>
+          <a:xfrm flipV="1">
+            <a:off x="0" y="0"/>
+            <a:ext cx="7267574" cy="4583115"/>
+          </a:xfrm>
+          <a:prstGeom prst="rtTriangle">
+            <a:avLst/>
+          </a:prstGeom>
+          <a:solidFill>
+            <a:srgbClr val="FFC000">
+              <a:alpha val="16863"/>
+            </a:srgbClr>
+          </a:solidFill>
+          <a:ln>
+            <a:noFill/>
+          </a:ln>
+        </p:spPr>
+        <p:style>
+          <a:lnRef idx="2">
+            <a:schemeClr val="accent1">
+              <a:shade val="50000"/>
+            </a:schemeClr>
+          </a:lnRef>
+          <a:fillRef idx="1">
+            <a:schemeClr val="accent1"/>
+          </a:fillRef>
+          <a:effectRef idx="0">
+            <a:schemeClr val="accent1"/>
+          </a:effectRef>
+          <a:fontRef idx="minor">
+            <a:schemeClr val="lt1"/>
+          </a:fontRef>
+        </p:style>
+        <p:txBody>
+          <a:bodyPr rtlCol="0" anchor="ctr"/>
+          <a:lstStyle/>
+          <a:p>
+            <a:pPr algn="ctr"/>
+            <a:endParaRPr lang="en-US"/>
+          </a:p>
+        </p:txBody>
+      </p:sp>
+      <p:sp>
+        <p:nvSpPr>
+          <p:cNvPr id="10" name="Right Triangle 9"/>
+          <p:cNvSpPr/>
+          <p:nvPr/>
+        </p:nvSpPr>
+        <p:spPr>
+          <a:xfrm flipV="1">
+            <a:off x="0" y="0"/>
+            <a:ext cx="8497019" cy="2000250"/>
+          </a:xfrm>
+          <a:prstGeom prst="rtTriangle">
+            <a:avLst/>
+          </a:prstGeom>
+          <a:solidFill>
+            <a:srgbClr val="00B050">
+              <a:alpha val="50196"/>
+            </a:srgbClr>
+          </a:solidFill>
+          <a:ln>
+            <a:noFill/>
+          </a:ln>
+        </p:spPr>
+        <p:style>
+          <a:lnRef idx="2">
+            <a:schemeClr val="accent1">
+              <a:shade val="50000"/>
+            </a:schemeClr>
+          </a:lnRef>
+          <a:fillRef idx="1">
+            <a:schemeClr val="accent1"/>
+          </a:fillRef>
+          <a:effectRef idx="0">
+            <a:schemeClr val="accent1"/>
+          </a:effectRef>
+          <a:fontRef idx="minor">
+            <a:schemeClr val="lt1"/>
+          </a:fontRef>
+        </p:style>
+        <p:txBody>
+          <a:bodyPr rtlCol="0" anchor="ctr"/>
+          <a:lstStyle/>
+          <a:p>
+            <a:pPr algn="ctr"/>
+            <a:endParaRPr lang="en-US"/>
+          </a:p>
+        </p:txBody>
+      </p:sp>
+    </p:spTree>
+    <p:extLst>
+      <p:ext uri="{BB962C8B-B14F-4D97-AF65-F5344CB8AC3E}">
+        <p14:creationId xmlns:p14="http://schemas.microsoft.com/office/powerpoint/2010/main" val="3800023274"/>
+      </p:ext>
+    </p:extLst>
+  </p:cSld>
+  <p:clrMapOvr>
+    <a:masterClrMapping/>
+  </p:clrMapOvr>
+  <p:timing>
+    <p:tnLst>
+      <p:par>
+        <p:cTn id="1" dur="indefinite" restart="never" nodeType="tmRoot"/>
+      </p:par>
+    </p:tnLst>
+  </p:timing>
+</p:sldLayout>
+</file>
+
+<file path=ppt/slideLayouts/slideLayout12.xml><?xml version="1.0" encoding="utf-8"?>
 <p:sldLayout xmlns:a="http://schemas.openxmlformats.org/drawingml/2006/main" xmlns:r="http://schemas.openxmlformats.org/officeDocument/2006/relationships" xmlns:p="http://schemas.openxmlformats.org/presentationml/2006/main" type="twoObj" preserve="1">
   <p:cSld name="Two Content">
     <p:spTree>
@@ -6085,6 +6650,150 @@
           </a:p>
         </p:txBody>
       </p:sp>
+      <p:sp>
+        <p:nvSpPr>
+          <p:cNvPr id="9" name="Right Triangle 8"/>
+          <p:cNvSpPr/>
+          <p:nvPr/>
+        </p:nvSpPr>
+        <p:spPr>
+          <a:xfrm flipH="1">
+            <a:off x="1" y="5993468"/>
+            <a:ext cx="12191999" cy="864532"/>
+          </a:xfrm>
+          <a:prstGeom prst="rtTriangle">
+            <a:avLst/>
+          </a:prstGeom>
+          <a:solidFill>
+            <a:srgbClr val="FFC000">
+              <a:alpha val="16863"/>
+            </a:srgbClr>
+          </a:solidFill>
+          <a:ln>
+            <a:noFill/>
+          </a:ln>
+        </p:spPr>
+        <p:style>
+          <a:lnRef idx="2">
+            <a:schemeClr val="accent1">
+              <a:shade val="50000"/>
+            </a:schemeClr>
+          </a:lnRef>
+          <a:fillRef idx="1">
+            <a:schemeClr val="accent1"/>
+          </a:fillRef>
+          <a:effectRef idx="0">
+            <a:schemeClr val="accent1"/>
+          </a:effectRef>
+          <a:fontRef idx="minor">
+            <a:schemeClr val="lt1"/>
+          </a:fontRef>
+        </p:style>
+        <p:txBody>
+          <a:bodyPr rtlCol="0" anchor="ctr"/>
+          <a:lstStyle/>
+          <a:p>
+            <a:pPr algn="ctr"/>
+            <a:endParaRPr lang="en-US"/>
+          </a:p>
+        </p:txBody>
+      </p:sp>
+      <p:sp>
+        <p:nvSpPr>
+          <p:cNvPr id="10" name="Right Triangle 9"/>
+          <p:cNvSpPr/>
+          <p:nvPr/>
+        </p:nvSpPr>
+        <p:spPr>
+          <a:xfrm flipH="1">
+            <a:off x="5436376" y="4453467"/>
+            <a:ext cx="6755624" cy="2404533"/>
+          </a:xfrm>
+          <a:prstGeom prst="rtTriangle">
+            <a:avLst/>
+          </a:prstGeom>
+          <a:solidFill>
+            <a:srgbClr val="00B0F0">
+              <a:alpha val="16863"/>
+            </a:srgbClr>
+          </a:solidFill>
+          <a:ln>
+            <a:noFill/>
+          </a:ln>
+        </p:spPr>
+        <p:style>
+          <a:lnRef idx="2">
+            <a:schemeClr val="accent1">
+              <a:shade val="50000"/>
+            </a:schemeClr>
+          </a:lnRef>
+          <a:fillRef idx="1">
+            <a:schemeClr val="accent1"/>
+          </a:fillRef>
+          <a:effectRef idx="0">
+            <a:schemeClr val="accent1"/>
+          </a:effectRef>
+          <a:fontRef idx="minor">
+            <a:schemeClr val="lt1"/>
+          </a:fontRef>
+        </p:style>
+        <p:txBody>
+          <a:bodyPr rtlCol="0" anchor="ctr"/>
+          <a:lstStyle/>
+          <a:p>
+            <a:pPr algn="ctr"/>
+            <a:endParaRPr lang="en-US"/>
+          </a:p>
+        </p:txBody>
+      </p:sp>
+      <p:sp>
+        <p:nvSpPr>
+          <p:cNvPr id="11" name="Right Triangle 10"/>
+          <p:cNvSpPr/>
+          <p:nvPr/>
+        </p:nvSpPr>
+        <p:spPr>
+          <a:xfrm flipH="1">
+            <a:off x="4293537" y="5808568"/>
+            <a:ext cx="7898463" cy="1049432"/>
+          </a:xfrm>
+          <a:prstGeom prst="rtTriangle">
+            <a:avLst/>
+          </a:prstGeom>
+          <a:solidFill>
+            <a:srgbClr val="00B050">
+              <a:alpha val="38039"/>
+            </a:srgbClr>
+          </a:solidFill>
+          <a:ln>
+            <a:noFill/>
+          </a:ln>
+        </p:spPr>
+        <p:style>
+          <a:lnRef idx="2">
+            <a:schemeClr val="accent1">
+              <a:shade val="50000"/>
+            </a:schemeClr>
+          </a:lnRef>
+          <a:fillRef idx="1">
+            <a:schemeClr val="accent1"/>
+          </a:fillRef>
+          <a:effectRef idx="0">
+            <a:schemeClr val="accent1"/>
+          </a:effectRef>
+          <a:fontRef idx="minor">
+            <a:schemeClr val="lt1"/>
+          </a:fontRef>
+        </p:style>
+        <p:txBody>
+          <a:bodyPr rtlCol="0" anchor="ctr"/>
+          <a:lstStyle/>
+          <a:p>
+            <a:pPr algn="ctr"/>
+            <a:endParaRPr lang="en-US"/>
+          </a:p>
+        </p:txBody>
+      </p:sp>
     </p:spTree>
     <p:extLst>
       <p:ext uri="{BB962C8B-B14F-4D97-AF65-F5344CB8AC3E}">
@@ -6098,7 +6807,7 @@
 </p:sldLayout>
 </file>
 
-<file path=ppt/slideLayouts/slideLayout12.xml><?xml version="1.0" encoding="utf-8"?>
+<file path=ppt/slideLayouts/slideLayout13.xml><?xml version="1.0" encoding="utf-8"?>
 <p:sldLayout xmlns:a="http://schemas.openxmlformats.org/drawingml/2006/main" xmlns:r="http://schemas.openxmlformats.org/officeDocument/2006/relationships" xmlns:p="http://schemas.openxmlformats.org/presentationml/2006/main" type="twoTxTwoObj" preserve="1">
   <p:cSld name="Comparison">
     <p:spTree>
@@ -6468,6 +7177,150 @@
           </a:p>
         </p:txBody>
       </p:sp>
+      <p:sp>
+        <p:nvSpPr>
+          <p:cNvPr id="10" name="Right Triangle 9"/>
+          <p:cNvSpPr/>
+          <p:nvPr userDrawn="1"/>
+        </p:nvSpPr>
+        <p:spPr>
+          <a:xfrm flipH="1">
+            <a:off x="1" y="5993468"/>
+            <a:ext cx="12191999" cy="864532"/>
+          </a:xfrm>
+          <a:prstGeom prst="rtTriangle">
+            <a:avLst/>
+          </a:prstGeom>
+          <a:solidFill>
+            <a:srgbClr val="FFC000">
+              <a:alpha val="16863"/>
+            </a:srgbClr>
+          </a:solidFill>
+          <a:ln>
+            <a:noFill/>
+          </a:ln>
+        </p:spPr>
+        <p:style>
+          <a:lnRef idx="2">
+            <a:schemeClr val="accent1">
+              <a:shade val="50000"/>
+            </a:schemeClr>
+          </a:lnRef>
+          <a:fillRef idx="1">
+            <a:schemeClr val="accent1"/>
+          </a:fillRef>
+          <a:effectRef idx="0">
+            <a:schemeClr val="accent1"/>
+          </a:effectRef>
+          <a:fontRef idx="minor">
+            <a:schemeClr val="lt1"/>
+          </a:fontRef>
+        </p:style>
+        <p:txBody>
+          <a:bodyPr rtlCol="0" anchor="ctr"/>
+          <a:lstStyle/>
+          <a:p>
+            <a:pPr algn="ctr"/>
+            <a:endParaRPr lang="en-US"/>
+          </a:p>
+        </p:txBody>
+      </p:sp>
+      <p:sp>
+        <p:nvSpPr>
+          <p:cNvPr id="11" name="Right Triangle 10"/>
+          <p:cNvSpPr/>
+          <p:nvPr userDrawn="1"/>
+        </p:nvSpPr>
+        <p:spPr>
+          <a:xfrm flipH="1">
+            <a:off x="5436376" y="4453467"/>
+            <a:ext cx="6755624" cy="2404533"/>
+          </a:xfrm>
+          <a:prstGeom prst="rtTriangle">
+            <a:avLst/>
+          </a:prstGeom>
+          <a:solidFill>
+            <a:srgbClr val="00B0F0">
+              <a:alpha val="16863"/>
+            </a:srgbClr>
+          </a:solidFill>
+          <a:ln>
+            <a:noFill/>
+          </a:ln>
+        </p:spPr>
+        <p:style>
+          <a:lnRef idx="2">
+            <a:schemeClr val="accent1">
+              <a:shade val="50000"/>
+            </a:schemeClr>
+          </a:lnRef>
+          <a:fillRef idx="1">
+            <a:schemeClr val="accent1"/>
+          </a:fillRef>
+          <a:effectRef idx="0">
+            <a:schemeClr val="accent1"/>
+          </a:effectRef>
+          <a:fontRef idx="minor">
+            <a:schemeClr val="lt1"/>
+          </a:fontRef>
+        </p:style>
+        <p:txBody>
+          <a:bodyPr rtlCol="0" anchor="ctr"/>
+          <a:lstStyle/>
+          <a:p>
+            <a:pPr algn="ctr"/>
+            <a:endParaRPr lang="en-US"/>
+          </a:p>
+        </p:txBody>
+      </p:sp>
+      <p:sp>
+        <p:nvSpPr>
+          <p:cNvPr id="12" name="Right Triangle 11"/>
+          <p:cNvSpPr/>
+          <p:nvPr userDrawn="1"/>
+        </p:nvSpPr>
+        <p:spPr>
+          <a:xfrm flipH="1">
+            <a:off x="4293537" y="5808568"/>
+            <a:ext cx="7898463" cy="1049432"/>
+          </a:xfrm>
+          <a:prstGeom prst="rtTriangle">
+            <a:avLst/>
+          </a:prstGeom>
+          <a:solidFill>
+            <a:srgbClr val="00B050">
+              <a:alpha val="38039"/>
+            </a:srgbClr>
+          </a:solidFill>
+          <a:ln>
+            <a:noFill/>
+          </a:ln>
+        </p:spPr>
+        <p:style>
+          <a:lnRef idx="2">
+            <a:schemeClr val="accent1">
+              <a:shade val="50000"/>
+            </a:schemeClr>
+          </a:lnRef>
+          <a:fillRef idx="1">
+            <a:schemeClr val="accent1"/>
+          </a:fillRef>
+          <a:effectRef idx="0">
+            <a:schemeClr val="accent1"/>
+          </a:effectRef>
+          <a:fontRef idx="minor">
+            <a:schemeClr val="lt1"/>
+          </a:fontRef>
+        </p:style>
+        <p:txBody>
+          <a:bodyPr rtlCol="0" anchor="ctr"/>
+          <a:lstStyle/>
+          <a:p>
+            <a:pPr algn="ctr"/>
+            <a:endParaRPr lang="en-US"/>
+          </a:p>
+        </p:txBody>
+      </p:sp>
     </p:spTree>
     <p:extLst>
       <p:ext uri="{BB962C8B-B14F-4D97-AF65-F5344CB8AC3E}">
@@ -6481,7 +7334,7 @@
 </p:sldLayout>
 </file>
 
-<file path=ppt/slideLayouts/slideLayout13.xml><?xml version="1.0" encoding="utf-8"?>
+<file path=ppt/slideLayouts/slideLayout14.xml><?xml version="1.0" encoding="utf-8"?>
 <p:sldLayout xmlns:a="http://schemas.openxmlformats.org/drawingml/2006/main" xmlns:r="http://schemas.openxmlformats.org/officeDocument/2006/relationships" xmlns:p="http://schemas.openxmlformats.org/presentationml/2006/main" type="titleOnly" preserve="1">
   <p:cSld name="Title Only">
     <p:spTree>
@@ -6607,7 +7460,7 @@
 </p:sldLayout>
 </file>
 
-<file path=ppt/slideLayouts/slideLayout14.xml><?xml version="1.0" encoding="utf-8"?>
+<file path=ppt/slideLayouts/slideLayout15.xml><?xml version="1.0" encoding="utf-8"?>
 <p:sldLayout xmlns:a="http://schemas.openxmlformats.org/drawingml/2006/main" xmlns:r="http://schemas.openxmlformats.org/officeDocument/2006/relationships" xmlns:p="http://schemas.openxmlformats.org/presentationml/2006/main" type="blank" preserve="1">
   <p:cSld name="Blank">
     <p:spTree>
@@ -6702,7 +7555,7 @@
 </p:sldLayout>
 </file>
 
-<file path=ppt/slideLayouts/slideLayout15.xml><?xml version="1.0" encoding="utf-8"?>
+<file path=ppt/slideLayouts/slideLayout16.xml><?xml version="1.0" encoding="utf-8"?>
 <p:sldLayout xmlns:a="http://schemas.openxmlformats.org/drawingml/2006/main" xmlns:r="http://schemas.openxmlformats.org/officeDocument/2006/relationships" xmlns:p="http://schemas.openxmlformats.org/presentationml/2006/main" type="objTx" preserve="1">
   <p:cSld name="Content with Caption">
     <p:spTree>
@@ -6979,7 +7832,7 @@
 </p:sldLayout>
 </file>
 
-<file path=ppt/slideLayouts/slideLayout16.xml><?xml version="1.0" encoding="utf-8"?>
+<file path=ppt/slideLayouts/slideLayout17.xml><?xml version="1.0" encoding="utf-8"?>
 <p:sldLayout xmlns:a="http://schemas.openxmlformats.org/drawingml/2006/main" xmlns:r="http://schemas.openxmlformats.org/officeDocument/2006/relationships" xmlns:p="http://schemas.openxmlformats.org/presentationml/2006/main" type="picTx" preserve="1">
   <p:cSld name="Picture with Caption">
     <p:spTree>
@@ -7232,7 +8085,7 @@
 </p:sldLayout>
 </file>
 
-<file path=ppt/slideLayouts/slideLayout17.xml><?xml version="1.0" encoding="utf-8"?>
+<file path=ppt/slideLayouts/slideLayout18.xml><?xml version="1.0" encoding="utf-8"?>
 <p:sldLayout xmlns:a="http://schemas.openxmlformats.org/drawingml/2006/main" xmlns:r="http://schemas.openxmlformats.org/officeDocument/2006/relationships" xmlns:p="http://schemas.openxmlformats.org/presentationml/2006/main" type="vertTx" preserve="1">
   <p:cSld name="Title and Vertical Text">
     <p:spTree>
@@ -7402,7 +8255,7 @@
 </p:sldLayout>
 </file>
 
-<file path=ppt/slideLayouts/slideLayout18.xml><?xml version="1.0" encoding="utf-8"?>
+<file path=ppt/slideLayouts/slideLayout19.xml><?xml version="1.0" encoding="utf-8"?>
 <p:sldLayout xmlns:a="http://schemas.openxmlformats.org/drawingml/2006/main" xmlns:r="http://schemas.openxmlformats.org/officeDocument/2006/relationships" xmlns:p="http://schemas.openxmlformats.org/presentationml/2006/main" type="vertTitleAndTx" preserve="1">
   <p:cSld name="Vertical Title and Text">
     <p:spTree>
@@ -10887,14 +11740,15 @@
     <p:sldLayoutId id="2147483651" r:id="rId8"/>
     <p:sldLayoutId id="2147483661" r:id="rId9"/>
     <p:sldLayoutId id="2147483664" r:id="rId10"/>
-    <p:sldLayoutId id="2147483652" r:id="rId11"/>
-    <p:sldLayoutId id="2147483653" r:id="rId12"/>
-    <p:sldLayoutId id="2147483654" r:id="rId13"/>
-    <p:sldLayoutId id="2147483655" r:id="rId14"/>
-    <p:sldLayoutId id="2147483656" r:id="rId15"/>
-    <p:sldLayoutId id="2147483657" r:id="rId16"/>
-    <p:sldLayoutId id="2147483658" r:id="rId17"/>
-    <p:sldLayoutId id="2147483659" r:id="rId18"/>
+    <p:sldLayoutId id="2147483667" r:id="rId11"/>
+    <p:sldLayoutId id="2147483652" r:id="rId12"/>
+    <p:sldLayoutId id="2147483653" r:id="rId13"/>
+    <p:sldLayoutId id="2147483654" r:id="rId14"/>
+    <p:sldLayoutId id="2147483655" r:id="rId15"/>
+    <p:sldLayoutId id="2147483656" r:id="rId16"/>
+    <p:sldLayoutId id="2147483657" r:id="rId17"/>
+    <p:sldLayoutId id="2147483658" r:id="rId18"/>
+    <p:sldLayoutId id="2147483659" r:id="rId19"/>
   </p:sldLayoutIdLst>
   <p:txStyles>
     <p:titleStyle>
@@ -11389,7 +12243,7 @@
         </p:blipFill>
         <p:spPr>
           <a:xfrm>
-            <a:off x="2276829" y="1850741"/>
+            <a:off x="2330874" y="1345431"/>
             <a:ext cx="2400300" cy="1428750"/>
           </a:xfrm>
           <a:prstGeom prst="rect">
@@ -11421,6 +12275,86 @@
           <a:xfrm>
             <a:off x="1727201" y="4730864"/>
             <a:ext cx="3499557" cy="971343"/>
+          </a:xfrm>
+          <a:prstGeom prst="rect">
+            <a:avLst/>
+          </a:prstGeom>
+        </p:spPr>
+      </p:pic>
+      <p:sp>
+        <p:nvSpPr>
+          <p:cNvPr id="6" name="TextBox 5"/>
+          <p:cNvSpPr txBox="1"/>
+          <p:nvPr/>
+        </p:nvSpPr>
+        <p:spPr>
+          <a:xfrm>
+            <a:off x="2446459" y="5517541"/>
+            <a:ext cx="2679195" cy="369332"/>
+          </a:xfrm>
+          <a:prstGeom prst="rect">
+            <a:avLst/>
+          </a:prstGeom>
+          <a:noFill/>
+        </p:spPr>
+        <p:txBody>
+          <a:bodyPr wrap="none" rtlCol="0">
+            <a:spAutoFit/>
+          </a:bodyPr>
+          <a:lstStyle/>
+          <a:p>
+            <a:r>
+              <a:rPr lang="en-US" b="1" smtClean="0"/>
+              <a:t>O</a:t>
+            </a:r>
+            <a:r>
+              <a:rPr lang="en-US" smtClean="0"/>
+              <a:t>bject </a:t>
+            </a:r>
+            <a:r>
+              <a:rPr lang="en-US" b="1" smtClean="0"/>
+              <a:t>R</a:t>
+            </a:r>
+            <a:r>
+              <a:rPr lang="en-US" smtClean="0"/>
+              <a:t>elational </a:t>
+            </a:r>
+            <a:r>
+              <a:rPr lang="en-US" b="1" smtClean="0"/>
+              <a:t>M</a:t>
+            </a:r>
+            <a:r>
+              <a:rPr lang="en-US" smtClean="0"/>
+              <a:t>apping</a:t>
+            </a:r>
+            <a:endParaRPr lang="en-US"/>
+          </a:p>
+        </p:txBody>
+      </p:sp>
+      <p:pic>
+        <p:nvPicPr>
+          <p:cNvPr id="8" name="Picture 7"/>
+          <p:cNvPicPr>
+            <a:picLocks noChangeAspect="1"/>
+          </p:cNvPicPr>
+          <p:nvPr/>
+        </p:nvPicPr>
+        <p:blipFill>
+          <a:blip r:embed="rId6">
+            <a:extLst>
+              <a:ext uri="{28A0092B-C50C-407E-A947-70E740481C1C}">
+                <a14:useLocalDpi xmlns:a14="http://schemas.microsoft.com/office/drawing/2010/main" val="0"/>
+              </a:ext>
+            </a:extLst>
+          </a:blip>
+          <a:stretch>
+            <a:fillRect/>
+          </a:stretch>
+        </p:blipFill>
+        <p:spPr>
+          <a:xfrm>
+            <a:off x="2066885" y="2670994"/>
+            <a:ext cx="3159873" cy="1401967"/>
           </a:xfrm>
           <a:prstGeom prst="rect">
             <a:avLst/>
@@ -11647,11 +12581,7 @@
             </a:r>
             <a:r>
               <a:rPr lang="vi-VN"/>
-              <a:t>là hỗ trợ sinh viên  cũng như người lao động ở xa tìm kiếm nhà trọ trong suốt quá trong quá trình học tập và làm việc ở thành phố Cần </a:t>
-            </a:r>
-            <a:r>
-              <a:rPr lang="vi-VN"/>
-              <a:t>Thơ</a:t>
+              <a:t>là hỗ trợ sinh viên  cũng như người lao động ở xa tìm kiếm nhà trọ trong suốt quá trong quá trình học tập và làm việc ở thành phố Cần Thơ</a:t>
             </a:r>
             <a:r>
               <a:rPr lang="vi-VN" smtClean="0"/>
@@ -12601,19 +13531,7 @@
                           <a:ea typeface="+mn-ea"/>
                           <a:cs typeface="+mn-cs"/>
                         </a:rPr>
-                        <a:t> </a:t>
-                      </a:r>
-                      <a:r>
-                        <a:rPr lang="en-US" sz="1800" kern="1200" smtClean="0">
-                          <a:solidFill>
-                            <a:schemeClr val="dk1"/>
-                          </a:solidFill>
-                          <a:effectLst/>
-                          <a:latin typeface="+mn-lt"/>
-                          <a:ea typeface="+mn-ea"/>
-                          <a:cs typeface="+mn-cs"/>
-                        </a:rPr>
-                        <a:t>thành viên: tìm</a:t>
+                        <a:t> thành viên: tìm</a:t>
                       </a:r>
                       <a:r>
                         <a:rPr lang="en-US" sz="1800" kern="1200" baseline="0" smtClean="0">
@@ -12773,6 +13691,372 @@
       </p:par>
     </p:tnLst>
   </p:timing>
+</p:sld>
+</file>
+
+<file path=ppt/slides/slide16.xml><?xml version="1.0" encoding="utf-8"?>
+<p:sld xmlns:a="http://schemas.openxmlformats.org/drawingml/2006/main" xmlns:r="http://schemas.openxmlformats.org/officeDocument/2006/relationships" xmlns:p="http://schemas.openxmlformats.org/presentationml/2006/main">
+  <p:cSld>
+    <p:spTree>
+      <p:nvGrpSpPr>
+        <p:cNvPr id="1" name=""/>
+        <p:cNvGrpSpPr/>
+        <p:nvPr/>
+      </p:nvGrpSpPr>
+      <p:grpSpPr>
+        <a:xfrm>
+          <a:off x="0" y="0"/>
+          <a:ext cx="0" cy="0"/>
+          <a:chOff x="0" y="0"/>
+          <a:chExt cx="0" cy="0"/>
+        </a:xfrm>
+      </p:grpSpPr>
+      <p:sp>
+        <p:nvSpPr>
+          <p:cNvPr id="7" name="Title 6"/>
+          <p:cNvSpPr>
+            <a:spLocks noGrp="1"/>
+          </p:cNvSpPr>
+          <p:nvPr>
+            <p:ph type="title"/>
+          </p:nvPr>
+        </p:nvSpPr>
+        <p:spPr/>
+        <p:txBody>
+          <a:bodyPr/>
+          <a:lstStyle/>
+          <a:p>
+            <a:r>
+              <a:rPr lang="en-US" smtClean="0"/>
+              <a:t>Tổng kết</a:t>
+            </a:r>
+            <a:endParaRPr lang="en-US"/>
+          </a:p>
+        </p:txBody>
+      </p:sp>
+      <p:sp>
+        <p:nvSpPr>
+          <p:cNvPr id="10" name="Text Placeholder 9"/>
+          <p:cNvSpPr>
+            <a:spLocks noGrp="1"/>
+          </p:cNvSpPr>
+          <p:nvPr>
+            <p:ph type="body" idx="1"/>
+          </p:nvPr>
+        </p:nvSpPr>
+        <p:spPr/>
+        <p:txBody>
+          <a:bodyPr/>
+          <a:lstStyle/>
+          <a:p>
+            <a:r>
+              <a:rPr lang="en-US" smtClean="0"/>
+              <a:t>Làm được</a:t>
+            </a:r>
+            <a:endParaRPr lang="en-US"/>
+          </a:p>
+        </p:txBody>
+      </p:sp>
+      <p:sp>
+        <p:nvSpPr>
+          <p:cNvPr id="11" name="Content Placeholder 10"/>
+          <p:cNvSpPr>
+            <a:spLocks noGrp="1"/>
+          </p:cNvSpPr>
+          <p:nvPr>
+            <p:ph sz="half" idx="2"/>
+          </p:nvPr>
+        </p:nvSpPr>
+        <p:spPr/>
+        <p:txBody>
+          <a:bodyPr>
+            <a:normAutofit fontScale="92500" lnSpcReduction="20000"/>
+          </a:bodyPr>
+          <a:lstStyle/>
+          <a:p>
+            <a:r>
+              <a:rPr lang="en-US" smtClean="0"/>
+              <a:t>Tạo Website chứa thông tin nhà trọ với các chức năng cơ bản.</a:t>
+            </a:r>
+          </a:p>
+          <a:p>
+            <a:r>
+              <a:rPr lang="en-US" smtClean="0"/>
+              <a:t>Người dùng có thể tương tác được với Google Maps.</a:t>
+            </a:r>
+          </a:p>
+          <a:p>
+            <a:r>
+              <a:rPr lang="en-US" smtClean="0"/>
+              <a:t>Giao diện khá đẹp, thân thiện.</a:t>
+            </a:r>
+          </a:p>
+          <a:p>
+            <a:r>
+              <a:rPr lang="en-US" smtClean="0"/>
+              <a:t>Trải nghiệm người dùng được tối ưu thông qua việc tự động hóa các bước nhập liệu bằng Javascript</a:t>
+            </a:r>
+          </a:p>
+          <a:p>
+            <a:r>
+              <a:rPr lang="en-US" smtClean="0"/>
+              <a:t>Website có tính xã hội khi tích hợp like và bình luận trên trang nhà trọ.</a:t>
+            </a:r>
+          </a:p>
+        </p:txBody>
+      </p:sp>
+      <p:sp>
+        <p:nvSpPr>
+          <p:cNvPr id="12" name="Text Placeholder 11"/>
+          <p:cNvSpPr>
+            <a:spLocks noGrp="1"/>
+          </p:cNvSpPr>
+          <p:nvPr>
+            <p:ph type="body" sz="quarter" idx="3"/>
+          </p:nvPr>
+        </p:nvSpPr>
+        <p:spPr/>
+        <p:txBody>
+          <a:bodyPr/>
+          <a:lstStyle/>
+          <a:p>
+            <a:r>
+              <a:rPr lang="en-US" smtClean="0"/>
+              <a:t>Chưa làm được</a:t>
+            </a:r>
+            <a:endParaRPr lang="en-US"/>
+          </a:p>
+        </p:txBody>
+      </p:sp>
+      <p:sp>
+        <p:nvSpPr>
+          <p:cNvPr id="13" name="Content Placeholder 12"/>
+          <p:cNvSpPr>
+            <a:spLocks noGrp="1"/>
+          </p:cNvSpPr>
+          <p:nvPr>
+            <p:ph sz="quarter" idx="4"/>
+          </p:nvPr>
+        </p:nvSpPr>
+        <p:spPr/>
+        <p:txBody>
+          <a:bodyPr/>
+          <a:lstStyle/>
+          <a:p>
+            <a:r>
+              <a:rPr lang="en-US" smtClean="0"/>
+              <a:t>Chức năng tìm kiếm còn ít điều kiện tìm kiếm.</a:t>
+            </a:r>
+          </a:p>
+          <a:p>
+            <a:r>
+              <a:rPr lang="en-US" smtClean="0"/>
+              <a:t>Thông tin nhà trọ còn thô sơ, chưa được sâu sắc.</a:t>
+            </a:r>
+          </a:p>
+          <a:p>
+            <a:r>
+              <a:rPr lang="en-US" smtClean="0"/>
+              <a:t>Hệ quản trị cơ sở dữ liệu sẽ không còn đảm đương được khi hệ thống ngày càng to và nhiều người sử dụng.</a:t>
+            </a:r>
+            <a:endParaRPr lang="en-US"/>
+          </a:p>
+        </p:txBody>
+      </p:sp>
+    </p:spTree>
+    <p:extLst>
+      <p:ext uri="{BB962C8B-B14F-4D97-AF65-F5344CB8AC3E}">
+        <p14:creationId xmlns:p14="http://schemas.microsoft.com/office/powerpoint/2010/main" val="1531159625"/>
+      </p:ext>
+    </p:extLst>
+  </p:cSld>
+  <p:clrMapOvr>
+    <a:masterClrMapping/>
+  </p:clrMapOvr>
+</p:sld>
+</file>
+
+<file path=ppt/slides/slide17.xml><?xml version="1.0" encoding="utf-8"?>
+<p:sld xmlns:a="http://schemas.openxmlformats.org/drawingml/2006/main" xmlns:r="http://schemas.openxmlformats.org/officeDocument/2006/relationships" xmlns:p="http://schemas.openxmlformats.org/presentationml/2006/main">
+  <p:cSld>
+    <p:spTree>
+      <p:nvGrpSpPr>
+        <p:cNvPr id="1" name=""/>
+        <p:cNvGrpSpPr/>
+        <p:nvPr/>
+      </p:nvGrpSpPr>
+      <p:grpSpPr>
+        <a:xfrm>
+          <a:off x="0" y="0"/>
+          <a:ext cx="0" cy="0"/>
+          <a:chOff x="0" y="0"/>
+          <a:chExt cx="0" cy="0"/>
+        </a:xfrm>
+      </p:grpSpPr>
+      <p:sp>
+        <p:nvSpPr>
+          <p:cNvPr id="7" name="Title 6"/>
+          <p:cNvSpPr>
+            <a:spLocks noGrp="1"/>
+          </p:cNvSpPr>
+          <p:nvPr>
+            <p:ph type="title"/>
+          </p:nvPr>
+        </p:nvSpPr>
+        <p:spPr/>
+        <p:txBody>
+          <a:bodyPr/>
+          <a:lstStyle/>
+          <a:p>
+            <a:r>
+              <a:rPr lang="en-US" smtClean="0"/>
+              <a:t>Hướng phát triển</a:t>
+            </a:r>
+            <a:endParaRPr lang="en-US"/>
+          </a:p>
+        </p:txBody>
+      </p:sp>
+      <p:sp>
+        <p:nvSpPr>
+          <p:cNvPr id="11" name="Content Placeholder 10"/>
+          <p:cNvSpPr>
+            <a:spLocks noGrp="1"/>
+          </p:cNvSpPr>
+          <p:nvPr>
+            <p:ph sz="half" idx="1"/>
+          </p:nvPr>
+        </p:nvSpPr>
+        <p:spPr>
+          <a:xfrm>
+            <a:off x="838200" y="1825625"/>
+            <a:ext cx="10515600" cy="4351338"/>
+          </a:xfrm>
+        </p:spPr>
+        <p:txBody>
+          <a:bodyPr>
+            <a:normAutofit/>
+          </a:bodyPr>
+          <a:lstStyle/>
+          <a:p>
+            <a:r>
+              <a:rPr lang="en-US" smtClean="0"/>
+              <a:t>Cải thiện chức năng tìm kiếm.</a:t>
+            </a:r>
+          </a:p>
+          <a:p>
+            <a:r>
+              <a:rPr lang="en-US" smtClean="0"/>
+              <a:t>Cải tiến quy trình xác nhận nhà trọ cho nhanh hơn.</a:t>
+            </a:r>
+          </a:p>
+          <a:p>
+            <a:r>
+              <a:rPr lang="en-US" smtClean="0"/>
+              <a:t>Chỉnh sửa cơ sở dữ liệu để có thể quản lý thông tin nhà trọ được chuyên sâu hơn.</a:t>
+            </a:r>
+          </a:p>
+          <a:p>
+            <a:r>
+              <a:rPr lang="en-US" smtClean="0"/>
+              <a:t>Sử dụng hệ quản trị lớn hơn để có thể phục vụ cộng đồng khi hệ thống ngày càng lớn.</a:t>
+            </a:r>
+          </a:p>
+          <a:p>
+            <a:r>
+              <a:rPr lang="en-US" smtClean="0"/>
+              <a:t>Viết thêm ứng dụng mobile “Thông tin nhà trọ” giúp người dùng có thể truy cập nội dung từ các thiết bị di động với các trải nghiệm mang tính “di động” hơn.</a:t>
+            </a:r>
+          </a:p>
+          <a:p>
+            <a:endParaRPr lang="en-US" smtClean="0"/>
+          </a:p>
+          <a:p>
+            <a:endParaRPr lang="en-US" smtClean="0"/>
+          </a:p>
+        </p:txBody>
+      </p:sp>
+    </p:spTree>
+    <p:extLst>
+      <p:ext uri="{BB962C8B-B14F-4D97-AF65-F5344CB8AC3E}">
+        <p14:creationId xmlns:p14="http://schemas.microsoft.com/office/powerpoint/2010/main" val="2943739391"/>
+      </p:ext>
+    </p:extLst>
+  </p:cSld>
+  <p:clrMapOvr>
+    <a:masterClrMapping/>
+  </p:clrMapOvr>
+</p:sld>
+</file>
+
+<file path=ppt/slides/slide18.xml><?xml version="1.0" encoding="utf-8"?>
+<p:sld xmlns:a="http://schemas.openxmlformats.org/drawingml/2006/main" xmlns:r="http://schemas.openxmlformats.org/officeDocument/2006/relationships" xmlns:p="http://schemas.openxmlformats.org/presentationml/2006/main">
+  <p:cSld>
+    <p:spTree>
+      <p:nvGrpSpPr>
+        <p:cNvPr id="1" name=""/>
+        <p:cNvGrpSpPr/>
+        <p:nvPr/>
+      </p:nvGrpSpPr>
+      <p:grpSpPr>
+        <a:xfrm>
+          <a:off x="0" y="0"/>
+          <a:ext cx="0" cy="0"/>
+          <a:chOff x="0" y="0"/>
+          <a:chExt cx="0" cy="0"/>
+        </a:xfrm>
+      </p:grpSpPr>
+      <p:sp>
+        <p:nvSpPr>
+          <p:cNvPr id="5" name="Title 4"/>
+          <p:cNvSpPr>
+            <a:spLocks noGrp="1"/>
+          </p:cNvSpPr>
+          <p:nvPr>
+            <p:ph type="ctrTitle"/>
+          </p:nvPr>
+        </p:nvSpPr>
+        <p:spPr/>
+        <p:txBody>
+          <a:bodyPr/>
+          <a:lstStyle/>
+          <a:p>
+            <a:r>
+              <a:rPr lang="en-US" smtClean="0"/>
+              <a:t>Cảm ơn!</a:t>
+            </a:r>
+            <a:endParaRPr lang="en-US"/>
+          </a:p>
+        </p:txBody>
+      </p:sp>
+      <p:sp>
+        <p:nvSpPr>
+          <p:cNvPr id="6" name="Subtitle 5"/>
+          <p:cNvSpPr>
+            <a:spLocks noGrp="1"/>
+          </p:cNvSpPr>
+          <p:nvPr>
+            <p:ph type="subTitle" idx="1"/>
+          </p:nvPr>
+        </p:nvSpPr>
+        <p:spPr/>
+        <p:txBody>
+          <a:bodyPr/>
+          <a:lstStyle/>
+          <a:p>
+            <a:endParaRPr lang="en-US"/>
+          </a:p>
+        </p:txBody>
+      </p:sp>
+    </p:spTree>
+    <p:extLst>
+      <p:ext uri="{BB962C8B-B14F-4D97-AF65-F5344CB8AC3E}">
+        <p14:creationId xmlns:p14="http://schemas.microsoft.com/office/powerpoint/2010/main" val="2135290749"/>
+      </p:ext>
+    </p:extLst>
+  </p:cSld>
+  <p:clrMapOvr>
+    <a:masterClrMapping/>
+  </p:clrMapOvr>
 </p:sld>
 </file>
 

</xml_diff>

<commit_message>
Cập nhật slide mục hướng phát triển
</commit_message>
<xml_diff>
--- a/docs/NL04_Báo cáo niên luận.pptx
+++ b/docs/NL04_Báo cáo niên luận.pptx
@@ -1240,364 +1240,6 @@
       <dsp:cNvGrpSpPr/>
     </dsp:nvGrpSpPr>
     <dsp:grpSpPr/>
-    <dsp:sp modelId="{E54CDE51-E83D-48F0-87AF-5355223EB7B3}">
-      <dsp:nvSpPr>
-        <dsp:cNvPr id="0" name=""/>
-        <dsp:cNvSpPr/>
-      </dsp:nvSpPr>
-      <dsp:spPr>
-        <a:xfrm>
-          <a:off x="5257006" y="1522570"/>
-          <a:ext cx="1842214" cy="639446"/>
-        </a:xfrm>
-        <a:custGeom>
-          <a:avLst/>
-          <a:gdLst/>
-          <a:ahLst/>
-          <a:cxnLst/>
-          <a:rect l="0" t="0" r="0" b="0"/>
-          <a:pathLst>
-            <a:path>
-              <a:moveTo>
-                <a:pt x="0" y="0"/>
-              </a:moveTo>
-              <a:lnTo>
-                <a:pt x="0" y="319723"/>
-              </a:lnTo>
-              <a:lnTo>
-                <a:pt x="1842214" y="319723"/>
-              </a:lnTo>
-              <a:lnTo>
-                <a:pt x="1842214" y="639446"/>
-              </a:lnTo>
-            </a:path>
-          </a:pathLst>
-        </a:custGeom>
-        <a:noFill/>
-        <a:ln w="12700" cap="flat" cmpd="sng" algn="ctr">
-          <a:solidFill>
-            <a:schemeClr val="accent1">
-              <a:shade val="60000"/>
-              <a:hueOff val="0"/>
-              <a:satOff val="0"/>
-              <a:lumOff val="0"/>
-              <a:alphaOff val="0"/>
-            </a:schemeClr>
-          </a:solidFill>
-          <a:prstDash val="solid"/>
-          <a:miter lim="800000"/>
-        </a:ln>
-        <a:effectLst/>
-      </dsp:spPr>
-      <dsp:style>
-        <a:lnRef idx="2">
-          <a:scrgbClr r="0" g="0" b="0"/>
-        </a:lnRef>
-        <a:fillRef idx="0">
-          <a:scrgbClr r="0" g="0" b="0"/>
-        </a:fillRef>
-        <a:effectRef idx="0">
-          <a:scrgbClr r="0" g="0" b="0"/>
-        </a:effectRef>
-        <a:fontRef idx="minor"/>
-      </dsp:style>
-    </dsp:sp>
-    <dsp:sp modelId="{F8016569-E2EA-4547-8F53-233676BA5B2C}">
-      <dsp:nvSpPr>
-        <dsp:cNvPr id="0" name=""/>
-        <dsp:cNvSpPr/>
-      </dsp:nvSpPr>
-      <dsp:spPr>
-        <a:xfrm>
-          <a:off x="3414791" y="1522570"/>
-          <a:ext cx="1842214" cy="639446"/>
-        </a:xfrm>
-        <a:custGeom>
-          <a:avLst/>
-          <a:gdLst/>
-          <a:ahLst/>
-          <a:cxnLst/>
-          <a:rect l="0" t="0" r="0" b="0"/>
-          <a:pathLst>
-            <a:path>
-              <a:moveTo>
-                <a:pt x="1842214" y="0"/>
-              </a:moveTo>
-              <a:lnTo>
-                <a:pt x="1842214" y="319723"/>
-              </a:lnTo>
-              <a:lnTo>
-                <a:pt x="0" y="319723"/>
-              </a:lnTo>
-              <a:lnTo>
-                <a:pt x="0" y="639446"/>
-              </a:lnTo>
-            </a:path>
-          </a:pathLst>
-        </a:custGeom>
-        <a:noFill/>
-        <a:ln w="12700" cap="flat" cmpd="sng" algn="ctr">
-          <a:solidFill>
-            <a:schemeClr val="accent1">
-              <a:shade val="60000"/>
-              <a:hueOff val="0"/>
-              <a:satOff val="0"/>
-              <a:lumOff val="0"/>
-              <a:alphaOff val="0"/>
-            </a:schemeClr>
-          </a:solidFill>
-          <a:prstDash val="solid"/>
-          <a:miter lim="800000"/>
-        </a:ln>
-        <a:effectLst/>
-      </dsp:spPr>
-      <dsp:style>
-        <a:lnRef idx="2">
-          <a:scrgbClr r="0" g="0" b="0"/>
-        </a:lnRef>
-        <a:fillRef idx="0">
-          <a:scrgbClr r="0" g="0" b="0"/>
-        </a:fillRef>
-        <a:effectRef idx="0">
-          <a:scrgbClr r="0" g="0" b="0"/>
-        </a:effectRef>
-        <a:fontRef idx="minor"/>
-      </dsp:style>
-    </dsp:sp>
-    <dsp:sp modelId="{05BBB6DD-027D-45BC-B086-2D143F57BCCE}">
-      <dsp:nvSpPr>
-        <dsp:cNvPr id="0" name=""/>
-        <dsp:cNvSpPr/>
-      </dsp:nvSpPr>
-      <dsp:spPr>
-        <a:xfrm>
-          <a:off x="3734514" y="79"/>
-          <a:ext cx="3044982" cy="1522491"/>
-        </a:xfrm>
-        <a:prstGeom prst="rect">
-          <a:avLst/>
-        </a:prstGeom>
-        <a:solidFill>
-          <a:schemeClr val="accent1">
-            <a:hueOff val="0"/>
-            <a:satOff val="0"/>
-            <a:lumOff val="0"/>
-            <a:alphaOff val="0"/>
-          </a:schemeClr>
-        </a:solidFill>
-        <a:ln w="12700" cap="flat" cmpd="sng" algn="ctr">
-          <a:solidFill>
-            <a:schemeClr val="lt1">
-              <a:hueOff val="0"/>
-              <a:satOff val="0"/>
-              <a:lumOff val="0"/>
-              <a:alphaOff val="0"/>
-            </a:schemeClr>
-          </a:solidFill>
-          <a:prstDash val="solid"/>
-          <a:miter lim="800000"/>
-        </a:ln>
-        <a:effectLst/>
-      </dsp:spPr>
-      <dsp:style>
-        <a:lnRef idx="2">
-          <a:scrgbClr r="0" g="0" b="0"/>
-        </a:lnRef>
-        <a:fillRef idx="1">
-          <a:scrgbClr r="0" g="0" b="0"/>
-        </a:fillRef>
-        <a:effectRef idx="0">
-          <a:scrgbClr r="0" g="0" b="0"/>
-        </a:effectRef>
-        <a:fontRef idx="minor">
-          <a:schemeClr val="lt1"/>
-        </a:fontRef>
-      </dsp:style>
-      <dsp:txBody>
-        <a:bodyPr spcFirstLastPara="0" vert="horz" wrap="square" lIns="12700" tIns="12700" rIns="12700" bIns="12700" numCol="1" spcCol="1270" anchor="ctr" anchorCtr="0">
-          <a:noAutofit/>
-        </a:bodyPr>
-        <a:lstStyle/>
-        <a:p>
-          <a:pPr lvl="0" algn="ctr" defTabSz="889000">
-            <a:lnSpc>
-              <a:spcPct val="90000"/>
-            </a:lnSpc>
-            <a:spcBef>
-              <a:spcPct val="0"/>
-            </a:spcBef>
-            <a:spcAft>
-              <a:spcPct val="35000"/>
-            </a:spcAft>
-          </a:pPr>
-          <a:r>
-            <a:rPr lang="en-US" sz="2000" kern="1200" smtClean="0"/>
-            <a:t>Lương Đức Duy</a:t>
-          </a:r>
-          <a:endParaRPr lang="en-US" sz="2000" kern="1200"/>
-        </a:p>
-      </dsp:txBody>
-      <dsp:txXfrm>
-        <a:off x="3734514" y="79"/>
-        <a:ext cx="3044982" cy="1522491"/>
-      </dsp:txXfrm>
-    </dsp:sp>
-    <dsp:sp modelId="{01792829-4886-455B-A91C-88A88BDB7AF0}">
-      <dsp:nvSpPr>
-        <dsp:cNvPr id="0" name=""/>
-        <dsp:cNvSpPr/>
-      </dsp:nvSpPr>
-      <dsp:spPr>
-        <a:xfrm>
-          <a:off x="1892300" y="2162017"/>
-          <a:ext cx="3044982" cy="1522491"/>
-        </a:xfrm>
-        <a:prstGeom prst="rect">
-          <a:avLst/>
-        </a:prstGeom>
-        <a:solidFill>
-          <a:schemeClr val="accent1">
-            <a:hueOff val="0"/>
-            <a:satOff val="0"/>
-            <a:lumOff val="0"/>
-            <a:alphaOff val="0"/>
-          </a:schemeClr>
-        </a:solidFill>
-        <a:ln w="12700" cap="flat" cmpd="sng" algn="ctr">
-          <a:solidFill>
-            <a:schemeClr val="lt1">
-              <a:hueOff val="0"/>
-              <a:satOff val="0"/>
-              <a:lumOff val="0"/>
-              <a:alphaOff val="0"/>
-            </a:schemeClr>
-          </a:solidFill>
-          <a:prstDash val="solid"/>
-          <a:miter lim="800000"/>
-        </a:ln>
-        <a:effectLst/>
-      </dsp:spPr>
-      <dsp:style>
-        <a:lnRef idx="2">
-          <a:scrgbClr r="0" g="0" b="0"/>
-        </a:lnRef>
-        <a:fillRef idx="1">
-          <a:scrgbClr r="0" g="0" b="0"/>
-        </a:fillRef>
-        <a:effectRef idx="0">
-          <a:scrgbClr r="0" g="0" b="0"/>
-        </a:effectRef>
-        <a:fontRef idx="minor">
-          <a:schemeClr val="lt1"/>
-        </a:fontRef>
-      </dsp:style>
-      <dsp:txBody>
-        <a:bodyPr spcFirstLastPara="0" vert="horz" wrap="square" lIns="12700" tIns="12700" rIns="12700" bIns="12700" numCol="1" spcCol="1270" anchor="ctr" anchorCtr="0">
-          <a:noAutofit/>
-        </a:bodyPr>
-        <a:lstStyle/>
-        <a:p>
-          <a:pPr lvl="0" algn="ctr" defTabSz="889000">
-            <a:lnSpc>
-              <a:spcPct val="90000"/>
-            </a:lnSpc>
-            <a:spcBef>
-              <a:spcPct val="0"/>
-            </a:spcBef>
-            <a:spcAft>
-              <a:spcPct val="35000"/>
-            </a:spcAft>
-          </a:pPr>
-          <a:r>
-            <a:rPr lang="en-US" sz="2000" kern="1200" smtClean="0"/>
-            <a:t>Nguyễn Hoàng Đông</a:t>
-          </a:r>
-          <a:endParaRPr lang="en-US" sz="2000" kern="1200"/>
-        </a:p>
-      </dsp:txBody>
-      <dsp:txXfrm>
-        <a:off x="1892300" y="2162017"/>
-        <a:ext cx="3044982" cy="1522491"/>
-      </dsp:txXfrm>
-    </dsp:sp>
-    <dsp:sp modelId="{29888ACB-A532-459D-9213-1E7F148EE712}">
-      <dsp:nvSpPr>
-        <dsp:cNvPr id="0" name=""/>
-        <dsp:cNvSpPr/>
-      </dsp:nvSpPr>
-      <dsp:spPr>
-        <a:xfrm>
-          <a:off x="5576729" y="2162017"/>
-          <a:ext cx="3044982" cy="1522491"/>
-        </a:xfrm>
-        <a:prstGeom prst="rect">
-          <a:avLst/>
-        </a:prstGeom>
-        <a:solidFill>
-          <a:schemeClr val="accent1">
-            <a:hueOff val="0"/>
-            <a:satOff val="0"/>
-            <a:lumOff val="0"/>
-            <a:alphaOff val="0"/>
-          </a:schemeClr>
-        </a:solidFill>
-        <a:ln w="12700" cap="flat" cmpd="sng" algn="ctr">
-          <a:solidFill>
-            <a:schemeClr val="lt1">
-              <a:hueOff val="0"/>
-              <a:satOff val="0"/>
-              <a:lumOff val="0"/>
-              <a:alphaOff val="0"/>
-            </a:schemeClr>
-          </a:solidFill>
-          <a:prstDash val="solid"/>
-          <a:miter lim="800000"/>
-        </a:ln>
-        <a:effectLst/>
-      </dsp:spPr>
-      <dsp:style>
-        <a:lnRef idx="2">
-          <a:scrgbClr r="0" g="0" b="0"/>
-        </a:lnRef>
-        <a:fillRef idx="1">
-          <a:scrgbClr r="0" g="0" b="0"/>
-        </a:fillRef>
-        <a:effectRef idx="0">
-          <a:scrgbClr r="0" g="0" b="0"/>
-        </a:effectRef>
-        <a:fontRef idx="minor">
-          <a:schemeClr val="lt1"/>
-        </a:fontRef>
-      </dsp:style>
-      <dsp:txBody>
-        <a:bodyPr spcFirstLastPara="0" vert="horz" wrap="square" lIns="12700" tIns="12700" rIns="12700" bIns="12700" numCol="1" spcCol="1270" anchor="ctr" anchorCtr="0">
-          <a:noAutofit/>
-        </a:bodyPr>
-        <a:lstStyle/>
-        <a:p>
-          <a:pPr lvl="0" algn="ctr" defTabSz="889000">
-            <a:lnSpc>
-              <a:spcPct val="90000"/>
-            </a:lnSpc>
-            <a:spcBef>
-              <a:spcPct val="0"/>
-            </a:spcBef>
-            <a:spcAft>
-              <a:spcPct val="35000"/>
-            </a:spcAft>
-          </a:pPr>
-          <a:r>
-            <a:rPr lang="en-US" sz="2000" kern="1200" smtClean="0"/>
-            <a:t>Ngô Minh Phương</a:t>
-          </a:r>
-          <a:endParaRPr lang="en-US" sz="2000" kern="1200"/>
-        </a:p>
-      </dsp:txBody>
-      <dsp:txXfrm>
-        <a:off x="5576729" y="2162017"/>
-        <a:ext cx="3044982" cy="1522491"/>
-      </dsp:txXfrm>
-    </dsp:sp>
   </dsp:spTree>
 </dsp:drawing>
 </file>
@@ -13934,7 +13576,7 @@
         </p:spPr>
         <p:txBody>
           <a:bodyPr>
-            <a:normAutofit/>
+            <a:normAutofit fontScale="92500" lnSpcReduction="20000"/>
           </a:bodyPr>
           <a:lstStyle/>
           <a:p>
@@ -13952,8 +13594,25 @@
           <a:p>
             <a:r>
               <a:rPr lang="en-US" smtClean="0"/>
-              <a:t>Chỉnh sửa cơ sở dữ liệu để có thể quản lý thông tin nhà trọ được chuyên sâu hơn.</a:t>
-            </a:r>
+              <a:t>Chỉnh sửa cơ sở dữ liệu để có thể quản lý thông tin nhà trọ được chuyên sâu hơn</a:t>
+            </a:r>
+            <a:r>
+              <a:rPr lang="en-US" smtClean="0"/>
+              <a:t>.</a:t>
+            </a:r>
+          </a:p>
+          <a:p>
+            <a:r>
+              <a:rPr lang="en-US" smtClean="0"/>
+              <a:t>Thêm tính năng thông báo về các hoạt động đối với tài khoản thành viên.</a:t>
+            </a:r>
+          </a:p>
+          <a:p>
+            <a:r>
+              <a:rPr lang="en-US" smtClean="0"/>
+              <a:t>Thêm tính năng tự động gửi email về các nhà trọ tiềm năng, được like, bình luận nhiều nhất hang tuần.</a:t>
+            </a:r>
+            <a:endParaRPr lang="en-US" smtClean="0"/>
           </a:p>
           <a:p>
             <a:r>

</xml_diff>